<commit_message>
modify the PPT and code
</commit_message>
<xml_diff>
--- a/06-Ansible develop.pptx
+++ b/06-Ansible develop.pptx
@@ -5,16 +5,18 @@
     <p:sldMasterId id="2147483648" r:id="rId1"/>
     <p:sldMasterId id="2147483660" r:id="rId2"/>
   </p:sldMasterIdLst>
+  <p:notesMasterIdLst>
+    <p:notesMasterId r:id="rId11"/>
+  </p:notesMasterIdLst>
   <p:sldIdLst>
     <p:sldId id="266" r:id="rId3"/>
     <p:sldId id="265" r:id="rId4"/>
     <p:sldId id="257" r:id="rId5"/>
     <p:sldId id="258" r:id="rId6"/>
-    <p:sldId id="264" r:id="rId7"/>
-    <p:sldId id="259" r:id="rId8"/>
-    <p:sldId id="260" r:id="rId9"/>
-    <p:sldId id="263" r:id="rId10"/>
-    <p:sldId id="261" r:id="rId11"/>
+    <p:sldId id="259" r:id="rId7"/>
+    <p:sldId id="260" r:id="rId8"/>
+    <p:sldId id="263" r:id="rId9"/>
+    <p:sldId id="261" r:id="rId10"/>
   </p:sldIdLst>
   <p:sldSz cx="12192000" cy="6858000"/>
   <p:notesSz cx="6858000" cy="9144000"/>
@@ -121,6 +123,440 @@
 </p:presentation>
 </file>
 
+<file path=ppt/notesMasters/notesMaster1.xml><?xml version="1.0" encoding="utf-8"?>
+<p:notesMaster xmlns:a="http://schemas.openxmlformats.org/drawingml/2006/main" xmlns:r="http://schemas.openxmlformats.org/officeDocument/2006/relationships" xmlns:p="http://schemas.openxmlformats.org/presentationml/2006/main">
+  <p:cSld>
+    <p:bg>
+      <p:bgRef idx="1001">
+        <a:schemeClr val="bg1"/>
+      </p:bgRef>
+    </p:bg>
+    <p:spTree>
+      <p:nvGrpSpPr>
+        <p:cNvPr id="1" name=""/>
+        <p:cNvGrpSpPr/>
+        <p:nvPr/>
+      </p:nvGrpSpPr>
+      <p:grpSpPr>
+        <a:xfrm>
+          <a:off x="0" y="0"/>
+          <a:ext cx="0" cy="0"/>
+          <a:chOff x="0" y="0"/>
+          <a:chExt cx="0" cy="0"/>
+        </a:xfrm>
+      </p:grpSpPr>
+      <p:sp>
+        <p:nvSpPr>
+          <p:cNvPr id="2" name="页眉占位符 1"/>
+          <p:cNvSpPr>
+            <a:spLocks noGrp="1"/>
+          </p:cNvSpPr>
+          <p:nvPr>
+            <p:ph type="hdr" sz="quarter"/>
+          </p:nvPr>
+        </p:nvSpPr>
+        <p:spPr>
+          <a:xfrm>
+            <a:off x="0" y="0"/>
+            <a:ext cx="2971800" cy="458788"/>
+          </a:xfrm>
+          <a:prstGeom prst="rect">
+            <a:avLst/>
+          </a:prstGeom>
+        </p:spPr>
+        <p:txBody>
+          <a:bodyPr vert="horz" lIns="91440" tIns="45720" rIns="91440" bIns="45720" rtlCol="0"/>
+          <a:lstStyle>
+            <a:lvl1pPr algn="l">
+              <a:defRPr sz="1200"/>
+            </a:lvl1pPr>
+          </a:lstStyle>
+          <a:p>
+            <a:endParaRPr lang="en-US"/>
+          </a:p>
+        </p:txBody>
+      </p:sp>
+      <p:sp>
+        <p:nvSpPr>
+          <p:cNvPr id="3" name="日期占位符 2"/>
+          <p:cNvSpPr>
+            <a:spLocks noGrp="1"/>
+          </p:cNvSpPr>
+          <p:nvPr>
+            <p:ph type="dt" idx="1"/>
+          </p:nvPr>
+        </p:nvSpPr>
+        <p:spPr>
+          <a:xfrm>
+            <a:off x="3884613" y="0"/>
+            <a:ext cx="2971800" cy="458788"/>
+          </a:xfrm>
+          <a:prstGeom prst="rect">
+            <a:avLst/>
+          </a:prstGeom>
+        </p:spPr>
+        <p:txBody>
+          <a:bodyPr vert="horz" lIns="91440" tIns="45720" rIns="91440" bIns="45720" rtlCol="0"/>
+          <a:lstStyle>
+            <a:lvl1pPr algn="r">
+              <a:defRPr sz="1200"/>
+            </a:lvl1pPr>
+          </a:lstStyle>
+          <a:p>
+            <a:fld id="{90AFF99C-13BE-4912-ACDD-1003A1CF9E0E}" type="datetimeFigureOut">
+              <a:rPr lang="en-US" smtClean="0"/>
+              <a:t>9/7/2017</a:t>
+            </a:fld>
+            <a:endParaRPr lang="en-US"/>
+          </a:p>
+        </p:txBody>
+      </p:sp>
+      <p:sp>
+        <p:nvSpPr>
+          <p:cNvPr id="4" name="幻灯片图像占位符 3"/>
+          <p:cNvSpPr>
+            <a:spLocks noGrp="1" noRot="1" noChangeAspect="1"/>
+          </p:cNvSpPr>
+          <p:nvPr>
+            <p:ph type="sldImg" idx="2"/>
+          </p:nvPr>
+        </p:nvSpPr>
+        <p:spPr>
+          <a:xfrm>
+            <a:off x="685800" y="1143000"/>
+            <a:ext cx="5486400" cy="3086100"/>
+          </a:xfrm>
+          <a:prstGeom prst="rect">
+            <a:avLst/>
+          </a:prstGeom>
+          <a:noFill/>
+          <a:ln w="12700">
+            <a:solidFill>
+              <a:prstClr val="black"/>
+            </a:solidFill>
+          </a:ln>
+        </p:spPr>
+        <p:txBody>
+          <a:bodyPr vert="horz" lIns="91440" tIns="45720" rIns="91440" bIns="45720" rtlCol="0" anchor="ctr"/>
+          <a:lstStyle/>
+          <a:p>
+            <a:endParaRPr lang="en-US"/>
+          </a:p>
+        </p:txBody>
+      </p:sp>
+      <p:sp>
+        <p:nvSpPr>
+          <p:cNvPr id="5" name="备注占位符 4"/>
+          <p:cNvSpPr>
+            <a:spLocks noGrp="1"/>
+          </p:cNvSpPr>
+          <p:nvPr>
+            <p:ph type="body" sz="quarter" idx="3"/>
+          </p:nvPr>
+        </p:nvSpPr>
+        <p:spPr>
+          <a:xfrm>
+            <a:off x="685800" y="4400550"/>
+            <a:ext cx="5486400" cy="3600450"/>
+          </a:xfrm>
+          <a:prstGeom prst="rect">
+            <a:avLst/>
+          </a:prstGeom>
+        </p:spPr>
+        <p:txBody>
+          <a:bodyPr vert="horz" lIns="91440" tIns="45720" rIns="91440" bIns="45720" rtlCol="0"/>
+          <a:lstStyle/>
+          <a:p>
+            <a:pPr lvl="0"/>
+            <a:r>
+              <a:rPr lang="zh-CN" altLang="en-US" smtClean="0"/>
+              <a:t>单击此处编辑母版文本样式</a:t>
+            </a:r>
+          </a:p>
+          <a:p>
+            <a:pPr lvl="1"/>
+            <a:r>
+              <a:rPr lang="zh-CN" altLang="en-US" smtClean="0"/>
+              <a:t>第二级</a:t>
+            </a:r>
+          </a:p>
+          <a:p>
+            <a:pPr lvl="2"/>
+            <a:r>
+              <a:rPr lang="zh-CN" altLang="en-US" smtClean="0"/>
+              <a:t>第三级</a:t>
+            </a:r>
+          </a:p>
+          <a:p>
+            <a:pPr lvl="3"/>
+            <a:r>
+              <a:rPr lang="zh-CN" altLang="en-US" smtClean="0"/>
+              <a:t>第四级</a:t>
+            </a:r>
+          </a:p>
+          <a:p>
+            <a:pPr lvl="4"/>
+            <a:r>
+              <a:rPr lang="zh-CN" altLang="en-US" smtClean="0"/>
+              <a:t>第五级</a:t>
+            </a:r>
+            <a:endParaRPr lang="en-US"/>
+          </a:p>
+        </p:txBody>
+      </p:sp>
+      <p:sp>
+        <p:nvSpPr>
+          <p:cNvPr id="6" name="页脚占位符 5"/>
+          <p:cNvSpPr>
+            <a:spLocks noGrp="1"/>
+          </p:cNvSpPr>
+          <p:nvPr>
+            <p:ph type="ftr" sz="quarter" idx="4"/>
+          </p:nvPr>
+        </p:nvSpPr>
+        <p:spPr>
+          <a:xfrm>
+            <a:off x="0" y="8685213"/>
+            <a:ext cx="2971800" cy="458787"/>
+          </a:xfrm>
+          <a:prstGeom prst="rect">
+            <a:avLst/>
+          </a:prstGeom>
+        </p:spPr>
+        <p:txBody>
+          <a:bodyPr vert="horz" lIns="91440" tIns="45720" rIns="91440" bIns="45720" rtlCol="0" anchor="b"/>
+          <a:lstStyle>
+            <a:lvl1pPr algn="l">
+              <a:defRPr sz="1200"/>
+            </a:lvl1pPr>
+          </a:lstStyle>
+          <a:p>
+            <a:endParaRPr lang="en-US"/>
+          </a:p>
+        </p:txBody>
+      </p:sp>
+      <p:sp>
+        <p:nvSpPr>
+          <p:cNvPr id="7" name="灯片编号占位符 6"/>
+          <p:cNvSpPr>
+            <a:spLocks noGrp="1"/>
+          </p:cNvSpPr>
+          <p:nvPr>
+            <p:ph type="sldNum" sz="quarter" idx="5"/>
+          </p:nvPr>
+        </p:nvSpPr>
+        <p:spPr>
+          <a:xfrm>
+            <a:off x="3884613" y="8685213"/>
+            <a:ext cx="2971800" cy="458787"/>
+          </a:xfrm>
+          <a:prstGeom prst="rect">
+            <a:avLst/>
+          </a:prstGeom>
+        </p:spPr>
+        <p:txBody>
+          <a:bodyPr vert="horz" lIns="91440" tIns="45720" rIns="91440" bIns="45720" rtlCol="0" anchor="b"/>
+          <a:lstStyle>
+            <a:lvl1pPr algn="r">
+              <a:defRPr sz="1200"/>
+            </a:lvl1pPr>
+          </a:lstStyle>
+          <a:p>
+            <a:fld id="{CDFB74FF-6BF1-452F-BA40-55FB723FB510}" type="slidenum">
+              <a:rPr lang="en-US" smtClean="0"/>
+              <a:t>‹#›</a:t>
+            </a:fld>
+            <a:endParaRPr lang="en-US"/>
+          </a:p>
+        </p:txBody>
+      </p:sp>
+    </p:spTree>
+    <p:extLst>
+      <p:ext uri="{BB962C8B-B14F-4D97-AF65-F5344CB8AC3E}">
+        <p14:creationId xmlns:p14="http://schemas.microsoft.com/office/powerpoint/2010/main" val="1030041821"/>
+      </p:ext>
+    </p:extLst>
+  </p:cSld>
+  <p:clrMap bg1="lt1" tx1="dk1" bg2="lt2" tx2="dk2" accent1="accent1" accent2="accent2" accent3="accent3" accent4="accent4" accent5="accent5" accent6="accent6" hlink="hlink" folHlink="folHlink"/>
+  <p:notesStyle>
+    <a:lvl1pPr marL="0" algn="l" defTabSz="914400" rtl="0" eaLnBrk="1" latinLnBrk="0" hangingPunct="1">
+      <a:defRPr sz="1200" kern="1200">
+        <a:solidFill>
+          <a:schemeClr val="tx1"/>
+        </a:solidFill>
+        <a:latin typeface="+mn-lt"/>
+        <a:ea typeface="+mn-ea"/>
+        <a:cs typeface="+mn-cs"/>
+      </a:defRPr>
+    </a:lvl1pPr>
+    <a:lvl2pPr marL="457200" algn="l" defTabSz="914400" rtl="0" eaLnBrk="1" latinLnBrk="0" hangingPunct="1">
+      <a:defRPr sz="1200" kern="1200">
+        <a:solidFill>
+          <a:schemeClr val="tx1"/>
+        </a:solidFill>
+        <a:latin typeface="+mn-lt"/>
+        <a:ea typeface="+mn-ea"/>
+        <a:cs typeface="+mn-cs"/>
+      </a:defRPr>
+    </a:lvl2pPr>
+    <a:lvl3pPr marL="914400" algn="l" defTabSz="914400" rtl="0" eaLnBrk="1" latinLnBrk="0" hangingPunct="1">
+      <a:defRPr sz="1200" kern="1200">
+        <a:solidFill>
+          <a:schemeClr val="tx1"/>
+        </a:solidFill>
+        <a:latin typeface="+mn-lt"/>
+        <a:ea typeface="+mn-ea"/>
+        <a:cs typeface="+mn-cs"/>
+      </a:defRPr>
+    </a:lvl3pPr>
+    <a:lvl4pPr marL="1371600" algn="l" defTabSz="914400" rtl="0" eaLnBrk="1" latinLnBrk="0" hangingPunct="1">
+      <a:defRPr sz="1200" kern="1200">
+        <a:solidFill>
+          <a:schemeClr val="tx1"/>
+        </a:solidFill>
+        <a:latin typeface="+mn-lt"/>
+        <a:ea typeface="+mn-ea"/>
+        <a:cs typeface="+mn-cs"/>
+      </a:defRPr>
+    </a:lvl4pPr>
+    <a:lvl5pPr marL="1828800" algn="l" defTabSz="914400" rtl="0" eaLnBrk="1" latinLnBrk="0" hangingPunct="1">
+      <a:defRPr sz="1200" kern="1200">
+        <a:solidFill>
+          <a:schemeClr val="tx1"/>
+        </a:solidFill>
+        <a:latin typeface="+mn-lt"/>
+        <a:ea typeface="+mn-ea"/>
+        <a:cs typeface="+mn-cs"/>
+      </a:defRPr>
+    </a:lvl5pPr>
+    <a:lvl6pPr marL="2286000" algn="l" defTabSz="914400" rtl="0" eaLnBrk="1" latinLnBrk="0" hangingPunct="1">
+      <a:defRPr sz="1200" kern="1200">
+        <a:solidFill>
+          <a:schemeClr val="tx1"/>
+        </a:solidFill>
+        <a:latin typeface="+mn-lt"/>
+        <a:ea typeface="+mn-ea"/>
+        <a:cs typeface="+mn-cs"/>
+      </a:defRPr>
+    </a:lvl6pPr>
+    <a:lvl7pPr marL="2743200" algn="l" defTabSz="914400" rtl="0" eaLnBrk="1" latinLnBrk="0" hangingPunct="1">
+      <a:defRPr sz="1200" kern="1200">
+        <a:solidFill>
+          <a:schemeClr val="tx1"/>
+        </a:solidFill>
+        <a:latin typeface="+mn-lt"/>
+        <a:ea typeface="+mn-ea"/>
+        <a:cs typeface="+mn-cs"/>
+      </a:defRPr>
+    </a:lvl7pPr>
+    <a:lvl8pPr marL="3200400" algn="l" defTabSz="914400" rtl="0" eaLnBrk="1" latinLnBrk="0" hangingPunct="1">
+      <a:defRPr sz="1200" kern="1200">
+        <a:solidFill>
+          <a:schemeClr val="tx1"/>
+        </a:solidFill>
+        <a:latin typeface="+mn-lt"/>
+        <a:ea typeface="+mn-ea"/>
+        <a:cs typeface="+mn-cs"/>
+      </a:defRPr>
+    </a:lvl8pPr>
+    <a:lvl9pPr marL="3657600" algn="l" defTabSz="914400" rtl="0" eaLnBrk="1" latinLnBrk="0" hangingPunct="1">
+      <a:defRPr sz="1200" kern="1200">
+        <a:solidFill>
+          <a:schemeClr val="tx1"/>
+        </a:solidFill>
+        <a:latin typeface="+mn-lt"/>
+        <a:ea typeface="+mn-ea"/>
+        <a:cs typeface="+mn-cs"/>
+      </a:defRPr>
+    </a:lvl9pPr>
+  </p:notesStyle>
+</p:notesMaster>
+</file>
+
+<file path=ppt/notesSlides/notesSlide1.xml><?xml version="1.0" encoding="utf-8"?>
+<p:notes xmlns:a="http://schemas.openxmlformats.org/drawingml/2006/main" xmlns:r="http://schemas.openxmlformats.org/officeDocument/2006/relationships" xmlns:p="http://schemas.openxmlformats.org/presentationml/2006/main">
+  <p:cSld>
+    <p:spTree>
+      <p:nvGrpSpPr>
+        <p:cNvPr id="1" name=""/>
+        <p:cNvGrpSpPr/>
+        <p:nvPr/>
+      </p:nvGrpSpPr>
+      <p:grpSpPr>
+        <a:xfrm>
+          <a:off x="0" y="0"/>
+          <a:ext cx="0" cy="0"/>
+          <a:chOff x="0" y="0"/>
+          <a:chExt cx="0" cy="0"/>
+        </a:xfrm>
+      </p:grpSpPr>
+      <p:sp>
+        <p:nvSpPr>
+          <p:cNvPr id="2" name="幻灯片图像占位符 1"/>
+          <p:cNvSpPr>
+            <a:spLocks noGrp="1" noRot="1" noChangeAspect="1"/>
+          </p:cNvSpPr>
+          <p:nvPr>
+            <p:ph type="sldImg"/>
+          </p:nvPr>
+        </p:nvSpPr>
+        <p:spPr/>
+      </p:sp>
+      <p:sp>
+        <p:nvSpPr>
+          <p:cNvPr id="3" name="备注占位符 2"/>
+          <p:cNvSpPr>
+            <a:spLocks noGrp="1"/>
+          </p:cNvSpPr>
+          <p:nvPr>
+            <p:ph type="body" idx="1"/>
+          </p:nvPr>
+        </p:nvSpPr>
+        <p:spPr/>
+        <p:txBody>
+          <a:bodyPr/>
+          <a:lstStyle/>
+          <a:p>
+            <a:endParaRPr lang="en-US" dirty="0"/>
+          </a:p>
+        </p:txBody>
+      </p:sp>
+      <p:sp>
+        <p:nvSpPr>
+          <p:cNvPr id="4" name="灯片编号占位符 3"/>
+          <p:cNvSpPr>
+            <a:spLocks noGrp="1"/>
+          </p:cNvSpPr>
+          <p:nvPr>
+            <p:ph type="sldNum" sz="quarter" idx="10"/>
+          </p:nvPr>
+        </p:nvSpPr>
+        <p:spPr/>
+        <p:txBody>
+          <a:bodyPr/>
+          <a:lstStyle/>
+          <a:p>
+            <a:fld id="{CDFB74FF-6BF1-452F-BA40-55FB723FB510}" type="slidenum">
+              <a:rPr lang="en-US" smtClean="0"/>
+              <a:t>6</a:t>
+            </a:fld>
+            <a:endParaRPr lang="en-US"/>
+          </a:p>
+        </p:txBody>
+      </p:sp>
+    </p:spTree>
+    <p:extLst>
+      <p:ext uri="{BB962C8B-B14F-4D97-AF65-F5344CB8AC3E}">
+        <p14:creationId xmlns:p14="http://schemas.microsoft.com/office/powerpoint/2010/main" val="3381382725"/>
+      </p:ext>
+    </p:extLst>
+  </p:cSld>
+  <p:clrMapOvr>
+    <a:masterClrMapping/>
+  </p:clrMapOvr>
+</p:notes>
+</file>
+
 <file path=ppt/slideLayouts/slideLayout1.xml><?xml version="1.0" encoding="utf-8"?>
 <p:sldLayout xmlns:a="http://schemas.openxmlformats.org/drawingml/2006/main" xmlns:r="http://schemas.openxmlformats.org/officeDocument/2006/relationships" xmlns:p="http://schemas.openxmlformats.org/presentationml/2006/main" type="title" preserve="1">
   <p:cSld name="标题幻灯片">
@@ -252,7 +688,7 @@
           <a:p>
             <a:fld id="{5031EC5B-F743-4982-A443-44F1B46250F2}" type="datetimeFigureOut">
               <a:rPr lang="en-US" smtClean="0"/>
-              <a:t>9/6/2017</a:t>
+              <a:t>9/7/2017</a:t>
             </a:fld>
             <a:endParaRPr lang="en-US"/>
           </a:p>
@@ -422,7 +858,7 @@
           <a:p>
             <a:fld id="{5031EC5B-F743-4982-A443-44F1B46250F2}" type="datetimeFigureOut">
               <a:rPr lang="en-US" smtClean="0"/>
-              <a:t>9/6/2017</a:t>
+              <a:t>9/7/2017</a:t>
             </a:fld>
             <a:endParaRPr lang="en-US"/>
           </a:p>
@@ -602,7 +1038,7 @@
           <a:p>
             <a:fld id="{5031EC5B-F743-4982-A443-44F1B46250F2}" type="datetimeFigureOut">
               <a:rPr lang="en-US" smtClean="0"/>
-              <a:t>9/6/2017</a:t>
+              <a:t>9/7/2017</a:t>
             </a:fld>
             <a:endParaRPr lang="en-US"/>
           </a:p>
@@ -801,7 +1237,7 @@
                 </a:solidFill>
               </a:rPr>
               <a:pPr/>
-              <a:t>9/6/2017</a:t>
+              <a:t>9/7/2017</a:t>
             </a:fld>
             <a:endParaRPr lang="en-US">
               <a:solidFill>
@@ -1003,7 +1439,7 @@
                 </a:solidFill>
               </a:rPr>
               <a:pPr/>
-              <a:t>9/6/2017</a:t>
+              <a:t>9/7/2017</a:t>
             </a:fld>
             <a:endParaRPr lang="en-US">
               <a:solidFill>
@@ -1281,7 +1717,7 @@
                 </a:solidFill>
               </a:rPr>
               <a:pPr/>
-              <a:t>9/6/2017</a:t>
+              <a:t>9/7/2017</a:t>
             </a:fld>
             <a:endParaRPr lang="en-US">
               <a:solidFill>
@@ -1545,7 +1981,7 @@
                 </a:solidFill>
               </a:rPr>
               <a:pPr/>
-              <a:t>9/6/2017</a:t>
+              <a:t>9/7/2017</a:t>
             </a:fld>
             <a:endParaRPr lang="en-US">
               <a:solidFill>
@@ -1944,7 +2380,7 @@
                 </a:solidFill>
               </a:rPr>
               <a:pPr/>
-              <a:t>9/6/2017</a:t>
+              <a:t>9/7/2017</a:t>
             </a:fld>
             <a:endParaRPr lang="en-US">
               <a:solidFill>
@@ -2094,7 +2530,7 @@
                 </a:solidFill>
               </a:rPr>
               <a:pPr/>
-              <a:t>9/6/2017</a:t>
+              <a:t>9/7/2017</a:t>
             </a:fld>
             <a:endParaRPr lang="en-US">
               <a:solidFill>
@@ -2221,7 +2657,7 @@
                 </a:solidFill>
               </a:rPr>
               <a:pPr/>
-              <a:t>9/6/2017</a:t>
+              <a:t>9/7/2017</a:t>
             </a:fld>
             <a:endParaRPr lang="en-US">
               <a:solidFill>
@@ -2530,7 +2966,7 @@
                 </a:solidFill>
               </a:rPr>
               <a:pPr/>
-              <a:t>9/6/2017</a:t>
+              <a:t>9/7/2017</a:t>
             </a:fld>
             <a:endParaRPr lang="en-US">
               <a:solidFill>
@@ -2725,7 +3161,7 @@
           <a:p>
             <a:fld id="{5031EC5B-F743-4982-A443-44F1B46250F2}" type="datetimeFigureOut">
               <a:rPr lang="en-US" smtClean="0"/>
-              <a:t>9/6/2017</a:t>
+              <a:t>9/7/2017</a:t>
             </a:fld>
             <a:endParaRPr lang="en-US"/>
           </a:p>
@@ -2985,7 +3421,7 @@
                 </a:solidFill>
               </a:rPr>
               <a:pPr/>
-              <a:t>9/6/2017</a:t>
+              <a:t>9/7/2017</a:t>
             </a:fld>
             <a:endParaRPr lang="en-US">
               <a:solidFill>
@@ -3187,7 +3623,7 @@
                 </a:solidFill>
               </a:rPr>
               <a:pPr/>
-              <a:t>9/6/2017</a:t>
+              <a:t>9/7/2017</a:t>
             </a:fld>
             <a:endParaRPr lang="en-US">
               <a:solidFill>
@@ -3399,7 +3835,7 @@
                 </a:solidFill>
               </a:rPr>
               <a:pPr/>
-              <a:t>9/6/2017</a:t>
+              <a:t>9/7/2017</a:t>
             </a:fld>
             <a:endParaRPr lang="en-US">
               <a:solidFill>
@@ -3670,7 +4106,7 @@
           <a:p>
             <a:fld id="{5031EC5B-F743-4982-A443-44F1B46250F2}" type="datetimeFigureOut">
               <a:rPr lang="en-US" smtClean="0"/>
-              <a:t>9/6/2017</a:t>
+              <a:t>9/7/2017</a:t>
             </a:fld>
             <a:endParaRPr lang="en-US"/>
           </a:p>
@@ -3902,7 +4338,7 @@
           <a:p>
             <a:fld id="{5031EC5B-F743-4982-A443-44F1B46250F2}" type="datetimeFigureOut">
               <a:rPr lang="en-US" smtClean="0"/>
-              <a:t>9/6/2017</a:t>
+              <a:t>9/7/2017</a:t>
             </a:fld>
             <a:endParaRPr lang="en-US"/>
           </a:p>
@@ -4269,7 +4705,7 @@
           <a:p>
             <a:fld id="{5031EC5B-F743-4982-A443-44F1B46250F2}" type="datetimeFigureOut">
               <a:rPr lang="en-US" smtClean="0"/>
-              <a:t>9/6/2017</a:t>
+              <a:t>9/7/2017</a:t>
             </a:fld>
             <a:endParaRPr lang="en-US"/>
           </a:p>
@@ -4387,7 +4823,7 @@
           <a:p>
             <a:fld id="{5031EC5B-F743-4982-A443-44F1B46250F2}" type="datetimeFigureOut">
               <a:rPr lang="en-US" smtClean="0"/>
-              <a:t>9/6/2017</a:t>
+              <a:t>9/7/2017</a:t>
             </a:fld>
             <a:endParaRPr lang="en-US"/>
           </a:p>
@@ -4482,7 +4918,7 @@
           <a:p>
             <a:fld id="{5031EC5B-F743-4982-A443-44F1B46250F2}" type="datetimeFigureOut">
               <a:rPr lang="en-US" smtClean="0"/>
-              <a:t>9/6/2017</a:t>
+              <a:t>9/7/2017</a:t>
             </a:fld>
             <a:endParaRPr lang="en-US"/>
           </a:p>
@@ -4759,7 +5195,7 @@
           <a:p>
             <a:fld id="{5031EC5B-F743-4982-A443-44F1B46250F2}" type="datetimeFigureOut">
               <a:rPr lang="en-US" smtClean="0"/>
-              <a:t>9/6/2017</a:t>
+              <a:t>9/7/2017</a:t>
             </a:fld>
             <a:endParaRPr lang="en-US"/>
           </a:p>
@@ -5012,7 +5448,7 @@
           <a:p>
             <a:fld id="{5031EC5B-F743-4982-A443-44F1B46250F2}" type="datetimeFigureOut">
               <a:rPr lang="en-US" smtClean="0"/>
-              <a:t>9/6/2017</a:t>
+              <a:t>9/7/2017</a:t>
             </a:fld>
             <a:endParaRPr lang="en-US"/>
           </a:p>
@@ -5225,7 +5661,7 @@
           <a:p>
             <a:fld id="{5031EC5B-F743-4982-A443-44F1B46250F2}" type="datetimeFigureOut">
               <a:rPr lang="en-US" smtClean="0"/>
-              <a:t>9/6/2017</a:t>
+              <a:t>9/7/2017</a:t>
             </a:fld>
             <a:endParaRPr lang="en-US"/>
           </a:p>
@@ -5772,7 +6208,7 @@
                 </a:solidFill>
               </a:rPr>
               <a:pPr/>
-              <a:t>9/6/2017</a:t>
+              <a:t>9/7/2017</a:t>
             </a:fld>
             <a:endParaRPr lang="en-US" smtClean="0">
               <a:solidFill>
@@ -6573,8 +7009,8 @@
         </p:blipFill>
         <p:spPr bwMode="auto">
           <a:xfrm>
-            <a:off x="827584" y="760655"/>
-            <a:ext cx="10755304" cy="5100499"/>
+            <a:off x="797604" y="760655"/>
+            <a:ext cx="10609911" cy="5031549"/>
           </a:xfrm>
           <a:prstGeom prst="rect">
             <a:avLst/>
@@ -6766,7 +7202,7 @@
         <p:spPr>
           <a:xfrm>
             <a:off x="838200" y="1825625"/>
-            <a:ext cx="10387519" cy="2872835"/>
+            <a:ext cx="10734207" cy="3360972"/>
           </a:xfrm>
         </p:spPr>
         <p:txBody>
@@ -6806,7 +7242,7 @@
             </a:r>
             <a:r>
               <a:rPr lang="en-US" altLang="zh-CN" dirty="0" smtClean="0"/>
-              <a:t> API</a:t>
+              <a:t> Python API</a:t>
             </a:r>
           </a:p>
           <a:p>
@@ -6816,13 +7252,8 @@
             </a:r>
             <a:r>
               <a:rPr lang="en-US" altLang="zh-CN" dirty="0" smtClean="0"/>
-              <a:t> </a:t>
-            </a:r>
-            <a:r>
-              <a:rPr lang="en-US" altLang="zh-CN" dirty="0" smtClean="0"/>
-              <a:t>Plugin</a:t>
-            </a:r>
-            <a:endParaRPr lang="en-US" altLang="zh-CN" dirty="0" smtClean="0"/>
+              <a:t> Plugin</a:t>
+            </a:r>
           </a:p>
         </p:txBody>
       </p:sp>
@@ -6995,40 +7426,87 @@
           </a:xfrm>
         </p:spPr>
         <p:txBody>
-          <a:bodyPr/>
+          <a:bodyPr>
+            <a:normAutofit lnSpcReduction="10000"/>
+          </a:bodyPr>
           <a:lstStyle/>
           <a:p>
             <a:r>
               <a:rPr lang="zh-CN" altLang="en-US" dirty="0" smtClean="0"/>
-              <a:t>为什么要</a:t>
-            </a:r>
+              <a:t>为什么要用动态</a:t>
+            </a:r>
+            <a:r>
+              <a:rPr lang="en-US" altLang="zh-CN" dirty="0" smtClean="0"/>
+              <a:t>Inventory</a:t>
+            </a:r>
+          </a:p>
+          <a:p>
+            <a:pPr lvl="1"/>
             <a:r>
               <a:rPr lang="zh-CN" altLang="en-US" dirty="0" smtClean="0"/>
-              <a:t>用动态</a:t>
+              <a:t>服务器信息存放在别的软件系统中</a:t>
+            </a:r>
+            <a:endParaRPr lang="en-US" altLang="zh-CN" dirty="0" smtClean="0"/>
+          </a:p>
+          <a:p>
+            <a:pPr marL="914400" lvl="2" indent="0">
+              <a:buNone/>
+            </a:pPr>
+            <a:r>
+              <a:rPr lang="zh-CN" altLang="en-US" dirty="0"/>
+              <a:t>例如</a:t>
             </a:r>
             <a:r>
               <a:rPr lang="en-US" altLang="zh-CN" dirty="0" smtClean="0"/>
-              <a:t>I</a:t>
+              <a:t>CMDB</a:t>
+            </a:r>
+            <a:r>
+              <a:rPr lang="zh-CN" altLang="en-US" dirty="0" smtClean="0"/>
+              <a:t>，</a:t>
+            </a:r>
+            <a:r>
+              <a:rPr lang="en-US" altLang="zh-CN" dirty="0" err="1" smtClean="0"/>
+              <a:t>Openstack</a:t>
+            </a:r>
+            <a:r>
+              <a:rPr lang="zh-CN" altLang="en-US" dirty="0" smtClean="0"/>
+              <a:t>，</a:t>
+            </a:r>
+            <a:r>
+              <a:rPr lang="en-US" altLang="zh-CN" dirty="0" err="1" smtClean="0"/>
+              <a:t>Zabbix</a:t>
+            </a:r>
+            <a:r>
+              <a:rPr lang="zh-CN" altLang="en-US" dirty="0" smtClean="0"/>
+              <a:t>，</a:t>
             </a:r>
             <a:r>
               <a:rPr lang="en-US" altLang="zh-CN" dirty="0" smtClean="0"/>
-              <a:t>nventory</a:t>
+              <a:t>cobbler</a:t>
+            </a:r>
+            <a:r>
+              <a:rPr lang="zh-CN" altLang="en-US" dirty="0" smtClean="0"/>
+              <a:t>装机系统等</a:t>
             </a:r>
             <a:endParaRPr lang="en-US" altLang="zh-CN" dirty="0" smtClean="0"/>
           </a:p>
           <a:p>
             <a:r>
-              <a:rPr lang="zh-CN" altLang="en-US" dirty="0" smtClean="0"/>
-              <a:t>如何生成</a:t>
-            </a:r>
-            <a:r>
-              <a:rPr lang="en-US" altLang="zh-CN" dirty="0" smtClean="0"/>
-              <a:t>Dynamic </a:t>
+              <a:rPr lang="zh-CN" altLang="en-US" dirty="0"/>
+              <a:t>动态</a:t>
             </a:r>
             <a:r>
               <a:rPr lang="en-US" altLang="zh-CN" dirty="0"/>
               <a:t>Inventory</a:t>
             </a:r>
+            <a:r>
+              <a:rPr lang="zh-CN" altLang="en-US" dirty="0" smtClean="0"/>
+              <a:t>的</a:t>
+            </a:r>
+            <a:r>
+              <a:rPr lang="zh-CN" altLang="en-US" dirty="0" smtClean="0"/>
+              <a:t>格式</a:t>
+            </a:r>
             <a:endParaRPr lang="en-US" altLang="zh-CN" dirty="0" smtClean="0"/>
           </a:p>
           <a:p>
@@ -7036,12 +7514,26 @@
               <a:buNone/>
             </a:pPr>
             <a:r>
+              <a:rPr lang="zh-CN" altLang="en-US" dirty="0" smtClean="0"/>
+              <a:t>如右图所示</a:t>
+            </a:r>
+            <a:endParaRPr lang="en-US" altLang="zh-CN" dirty="0" smtClean="0"/>
+          </a:p>
+          <a:p>
+            <a:r>
+              <a:rPr lang="zh-CN" altLang="en-US" dirty="0" smtClean="0"/>
+              <a:t>如何生成动态</a:t>
+            </a:r>
+            <a:r>
               <a:rPr lang="en-US" altLang="zh-CN" dirty="0" smtClean="0"/>
-              <a:t>1. </a:t>
-            </a:r>
+              <a:t>Inventory</a:t>
+            </a:r>
+          </a:p>
+          <a:p>
+            <a:pPr lvl="1"/>
             <a:r>
               <a:rPr lang="zh-CN" altLang="en-US" dirty="0" smtClean="0"/>
-              <a:t>从</a:t>
+              <a:t>演示如何从</a:t>
             </a:r>
             <a:r>
               <a:rPr lang="en-US" altLang="zh-CN" dirty="0" smtClean="0"/>
@@ -7049,11 +7541,7 @@
             </a:r>
             <a:r>
               <a:rPr lang="zh-CN" altLang="en-US" dirty="0" smtClean="0"/>
-              <a:t>中</a:t>
-            </a:r>
-            <a:r>
-              <a:rPr lang="zh-CN" altLang="en-US" dirty="0" smtClean="0"/>
-              <a:t>获取</a:t>
+              <a:t>中获取</a:t>
             </a:r>
             <a:r>
               <a:rPr lang="en-US" altLang="zh-CN" dirty="0"/>
@@ -7086,27 +7574,8 @@
           </a:p>
           <a:p>
             <a:r>
-              <a:rPr lang="zh-CN" altLang="en-US" dirty="0" smtClean="0"/>
-              <a:t>动态</a:t>
-            </a:r>
-            <a:r>
-              <a:rPr lang="en-US" altLang="zh-CN" dirty="0" smtClean="0"/>
-              <a:t>Inventory</a:t>
-            </a:r>
-            <a:r>
-              <a:rPr lang="zh-CN" altLang="en-US" dirty="0" smtClean="0"/>
-              <a:t>的</a:t>
-            </a:r>
-            <a:r>
-              <a:rPr lang="zh-CN" altLang="en-US" smtClean="0"/>
-              <a:t>输出格式</a:t>
-            </a:r>
-            <a:endParaRPr lang="en-US" altLang="zh-CN" dirty="0" smtClean="0"/>
-          </a:p>
-          <a:p>
-            <a:r>
-              <a:rPr lang="zh-CN" altLang="en-US" dirty="0" smtClean="0"/>
-              <a:t>怎样</a:t>
+              <a:rPr lang="zh-CN" altLang="en-US" dirty="0"/>
+              <a:t>如何</a:t>
             </a:r>
             <a:r>
               <a:rPr lang="zh-CN" altLang="en-US" dirty="0" smtClean="0"/>
@@ -7161,6 +7630,30 @@
           </a:extLst>
         </p:spPr>
       </p:pic>
+      <p:pic>
+        <p:nvPicPr>
+          <p:cNvPr id="6" name="图片 5"/>
+          <p:cNvPicPr>
+            <a:picLocks noChangeAspect="1"/>
+          </p:cNvPicPr>
+          <p:nvPr/>
+        </p:nvPicPr>
+        <p:blipFill>
+          <a:blip r:embed="rId3"/>
+          <a:stretch>
+            <a:fillRect/>
+          </a:stretch>
+        </p:blipFill>
+        <p:spPr>
+          <a:xfrm>
+            <a:off x="9045902" y="794479"/>
+            <a:ext cx="3045489" cy="4730386"/>
+          </a:xfrm>
+          <a:prstGeom prst="rect">
+            <a:avLst/>
+          </a:prstGeom>
+        </p:spPr>
+      </p:pic>
     </p:spTree>
     <p:extLst>
       <p:ext uri="{BB962C8B-B14F-4D97-AF65-F5344CB8AC3E}">
@@ -7182,158 +7675,6 @@
 </file>
 
 <file path=ppt/slides/slide5.xml><?xml version="1.0" encoding="utf-8"?>
-<p:sld xmlns:a="http://schemas.openxmlformats.org/drawingml/2006/main" xmlns:r="http://schemas.openxmlformats.org/officeDocument/2006/relationships" xmlns:p="http://schemas.openxmlformats.org/presentationml/2006/main">
-  <p:cSld>
-    <p:spTree>
-      <p:nvGrpSpPr>
-        <p:cNvPr id="1" name=""/>
-        <p:cNvGrpSpPr/>
-        <p:nvPr/>
-      </p:nvGrpSpPr>
-      <p:grpSpPr>
-        <a:xfrm>
-          <a:off x="0" y="0"/>
-          <a:ext cx="0" cy="0"/>
-          <a:chOff x="0" y="0"/>
-          <a:chExt cx="0" cy="0"/>
-        </a:xfrm>
-      </p:grpSpPr>
-      <p:sp>
-        <p:nvSpPr>
-          <p:cNvPr id="2" name="Title 1"/>
-          <p:cNvSpPr>
-            <a:spLocks noGrp="1"/>
-          </p:cNvSpPr>
-          <p:nvPr>
-            <p:ph type="title"/>
-          </p:nvPr>
-        </p:nvSpPr>
-        <p:spPr/>
-        <p:txBody>
-          <a:bodyPr/>
-          <a:lstStyle/>
-          <a:p>
-            <a:pPr algn="ctr"/>
-            <a:r>
-              <a:rPr lang="zh-CN" altLang="en-US" dirty="0" smtClean="0"/>
-              <a:t>使用</a:t>
-            </a:r>
-            <a:r>
-              <a:rPr lang="en-US" altLang="zh-CN" dirty="0" smtClean="0"/>
-              <a:t>CMDB</a:t>
-            </a:r>
-            <a:endParaRPr lang="en-US" dirty="0"/>
-          </a:p>
-        </p:txBody>
-      </p:sp>
-      <p:sp>
-        <p:nvSpPr>
-          <p:cNvPr id="3" name="Content Placeholder 2"/>
-          <p:cNvSpPr>
-            <a:spLocks noGrp="1"/>
-          </p:cNvSpPr>
-          <p:nvPr>
-            <p:ph idx="1"/>
-          </p:nvPr>
-        </p:nvSpPr>
-        <p:spPr/>
-        <p:txBody>
-          <a:bodyPr/>
-          <a:lstStyle/>
-          <a:p>
-            <a:r>
-              <a:rPr lang="zh-CN" altLang="en-US" dirty="0" smtClean="0"/>
-              <a:t>练习的要点</a:t>
-            </a:r>
-          </a:p>
-          <a:p>
-            <a:r>
-              <a:rPr lang="en-US" altLang="zh-CN" dirty="0" smtClean="0"/>
-              <a:t>1</a:t>
-            </a:r>
-            <a:endParaRPr lang="zh-CN" altLang="en-US" dirty="0" smtClean="0"/>
-          </a:p>
-          <a:p>
-            <a:r>
-              <a:rPr lang="en-US" altLang="zh-CN" dirty="0" smtClean="0"/>
-              <a:t>2</a:t>
-            </a:r>
-            <a:endParaRPr lang="zh-CN" altLang="en-US" dirty="0" smtClean="0"/>
-          </a:p>
-          <a:p>
-            <a:r>
-              <a:rPr lang="en-US" altLang="zh-CN" dirty="0" smtClean="0"/>
-              <a:t>3</a:t>
-            </a:r>
-            <a:endParaRPr lang="zh-CN" altLang="en-US" dirty="0" smtClean="0"/>
-          </a:p>
-          <a:p>
-            <a:endParaRPr lang="en-US" dirty="0"/>
-          </a:p>
-        </p:txBody>
-      </p:sp>
-      <p:pic>
-        <p:nvPicPr>
-          <p:cNvPr id="4" name="Picture 3" descr="http://www.yuntoutiao.com/wp-content/uploads/2015/10/1016.sdt-redhat.jpg-300x122.jpg"/>
-          <p:cNvPicPr>
-            <a:picLocks noChangeAspect="1" noChangeArrowheads="1"/>
-          </p:cNvPicPr>
-          <p:nvPr/>
-        </p:nvPicPr>
-        <p:blipFill>
-          <a:blip r:embed="rId2">
-            <a:extLst>
-              <a:ext uri="{28A0092B-C50C-407E-A947-70E740481C1C}">
-                <a14:useLocalDpi xmlns:a14="http://schemas.microsoft.com/office/drawing/2010/main" val="0"/>
-              </a:ext>
-            </a:extLst>
-          </a:blip>
-          <a:srcRect/>
-          <a:stretch>
-            <a:fillRect/>
-          </a:stretch>
-        </p:blipFill>
-        <p:spPr bwMode="auto">
-          <a:xfrm>
-            <a:off x="9324545" y="5825184"/>
-            <a:ext cx="2681924" cy="817987"/>
-          </a:xfrm>
-          <a:prstGeom prst="rect">
-            <a:avLst/>
-          </a:prstGeom>
-          <a:noFill/>
-          <a:extLst>
-            <a:ext uri="{909E8E84-426E-40DD-AFC4-6F175D3DCCD1}">
-              <a14:hiddenFill xmlns:a14="http://schemas.microsoft.com/office/drawing/2010/main">
-                <a:solidFill>
-                  <a:srgbClr val="FFFFFF"/>
-                </a:solidFill>
-              </a14:hiddenFill>
-            </a:ext>
-          </a:extLst>
-        </p:spPr>
-      </p:pic>
-    </p:spTree>
-    <p:extLst>
-      <p:ext uri="{BB962C8B-B14F-4D97-AF65-F5344CB8AC3E}">
-        <p14:creationId xmlns:p14="http://schemas.microsoft.com/office/powerpoint/2010/main" val="2124074321"/>
-      </p:ext>
-    </p:extLst>
-  </p:cSld>
-  <p:clrMapOvr>
-    <a:masterClrMapping/>
-  </p:clrMapOvr>
-  <p:timing>
-    <p:tnLst>
-      <p:par>
-        <p:cTn id="1" dur="indefinite" restart="never" nodeType="tmRoot"/>
-      </p:par>
-    </p:tnLst>
-  </p:timing>
-</p:sld>
-</file>
-
-<file path=ppt/slides/slide6.xml><?xml version="1.0" encoding="utf-8"?>
 <p:sld xmlns:a="http://schemas.openxmlformats.org/drawingml/2006/main" xmlns:r="http://schemas.openxmlformats.org/officeDocument/2006/relationships" xmlns:p="http://schemas.openxmlformats.org/presentationml/2006/main">
   <p:cSld>
     <p:bg>
@@ -7368,12 +7709,223 @@
             <p:ph type="title"/>
           </p:nvPr>
         </p:nvSpPr>
-        <p:spPr/>
+        <p:spPr>
+          <a:xfrm>
+            <a:off x="838200" y="148283"/>
+            <a:ext cx="10515600" cy="1325563"/>
+          </a:xfrm>
+        </p:spPr>
         <p:txBody>
           <a:bodyPr/>
           <a:lstStyle/>
           <a:p>
             <a:pPr algn="ctr"/>
+            <a:r>
+              <a:rPr lang="en-US" altLang="zh-CN" b="1" dirty="0" err="1" smtClean="0"/>
+              <a:t>Ansible</a:t>
+            </a:r>
+            <a:r>
+              <a:rPr lang="en-US" altLang="zh-CN" b="1" dirty="0" smtClean="0"/>
+              <a:t> Module</a:t>
+            </a:r>
+            <a:endParaRPr lang="en-US" b="1" dirty="0"/>
+          </a:p>
+        </p:txBody>
+      </p:sp>
+      <p:sp>
+        <p:nvSpPr>
+          <p:cNvPr id="3" name="内容占位符 2"/>
+          <p:cNvSpPr>
+            <a:spLocks noGrp="1"/>
+          </p:cNvSpPr>
+          <p:nvPr>
+            <p:ph idx="1"/>
+          </p:nvPr>
+        </p:nvSpPr>
+        <p:spPr>
+          <a:xfrm>
+            <a:off x="838200" y="1473846"/>
+            <a:ext cx="10515600" cy="4351338"/>
+          </a:xfrm>
+          <a:noFill/>
+        </p:spPr>
+        <p:txBody>
+          <a:bodyPr>
+            <a:normAutofit fontScale="92500" lnSpcReduction="10000"/>
+          </a:bodyPr>
+          <a:lstStyle/>
+          <a:p>
+            <a:r>
+              <a:rPr lang="zh-CN" altLang="en-US" dirty="0" smtClean="0"/>
+              <a:t>为什么要</a:t>
+            </a:r>
+            <a:r>
+              <a:rPr lang="en-US" altLang="zh-CN" dirty="0" smtClean="0"/>
+              <a:t>(</a:t>
+            </a:r>
+            <a:r>
+              <a:rPr lang="zh-CN" altLang="en-US" dirty="0" smtClean="0"/>
+              <a:t>是否有必要</a:t>
+            </a:r>
+            <a:r>
+              <a:rPr lang="en-US" altLang="zh-CN" dirty="0" smtClean="0"/>
+              <a:t>)</a:t>
+            </a:r>
+            <a:r>
+              <a:rPr lang="zh-CN" altLang="en-US" dirty="0" smtClean="0"/>
+              <a:t>开发自己的</a:t>
+            </a:r>
+            <a:r>
+              <a:rPr lang="en-US" altLang="zh-CN" dirty="0" err="1"/>
+              <a:t>A</a:t>
+            </a:r>
+            <a:r>
+              <a:rPr lang="en-US" altLang="zh-CN" dirty="0" err="1" smtClean="0"/>
+              <a:t>nsible</a:t>
+            </a:r>
+            <a:r>
+              <a:rPr lang="en-US" altLang="zh-CN" dirty="0" smtClean="0"/>
+              <a:t> </a:t>
+            </a:r>
+            <a:r>
+              <a:rPr lang="en-US" altLang="zh-CN" dirty="0" smtClean="0"/>
+              <a:t>Module</a:t>
+            </a:r>
+          </a:p>
+          <a:p>
+            <a:pPr lvl="1"/>
+            <a:r>
+              <a:rPr lang="zh-CN" altLang="en-US" dirty="0" smtClean="0"/>
+              <a:t>使用</a:t>
+            </a:r>
+            <a:r>
+              <a:rPr lang="en-US" altLang="zh-CN" dirty="0" err="1" smtClean="0"/>
+              <a:t>ansible</a:t>
+            </a:r>
+            <a:r>
+              <a:rPr lang="en-US" altLang="zh-CN" dirty="0" smtClean="0"/>
+              <a:t>-doc </a:t>
+            </a:r>
+            <a:r>
+              <a:rPr lang="zh-CN" altLang="en-US" dirty="0" smtClean="0"/>
+              <a:t>可以列出有哪些模块可以使用</a:t>
+            </a:r>
+            <a:endParaRPr lang="en-US" altLang="zh-CN" dirty="0" smtClean="0"/>
+          </a:p>
+          <a:p>
+            <a:pPr lvl="1"/>
+            <a:r>
+              <a:rPr lang="zh-CN" altLang="en-US" dirty="0" smtClean="0"/>
+              <a:t>如果有特殊的需求可以使用</a:t>
+            </a:r>
+            <a:r>
+              <a:rPr lang="en-US" altLang="zh-CN" dirty="0" smtClean="0"/>
+              <a:t>script</a:t>
+            </a:r>
+            <a:r>
+              <a:rPr lang="zh-CN" altLang="en-US" dirty="0" smtClean="0"/>
+              <a:t>模块</a:t>
+            </a:r>
+            <a:endParaRPr lang="en-US" altLang="zh-CN" dirty="0" smtClean="0"/>
+          </a:p>
+          <a:p>
+            <a:r>
+              <a:rPr lang="zh-CN" altLang="en-US" dirty="0" smtClean="0"/>
+              <a:t>使用</a:t>
+            </a:r>
+            <a:r>
+              <a:rPr lang="en-US" altLang="zh-CN" dirty="0" smtClean="0"/>
+              <a:t>script</a:t>
+            </a:r>
+            <a:r>
+              <a:rPr lang="zh-CN" altLang="en-US" dirty="0" smtClean="0"/>
+              <a:t>模块来</a:t>
+            </a:r>
+            <a:r>
+              <a:rPr lang="zh-CN" altLang="en-US" dirty="0" smtClean="0"/>
+              <a:t>执行特殊的需求</a:t>
+            </a:r>
+            <a:endParaRPr lang="en-US" altLang="zh-CN" dirty="0"/>
+          </a:p>
+          <a:p>
+            <a:pPr lvl="1"/>
+            <a:r>
+              <a:rPr lang="zh-CN" altLang="en-US" dirty="0" smtClean="0"/>
+              <a:t>演示如何使用</a:t>
+            </a:r>
+            <a:r>
+              <a:rPr lang="en-US" altLang="zh-CN" dirty="0" smtClean="0"/>
+              <a:t>script</a:t>
+            </a:r>
+            <a:r>
+              <a:rPr lang="zh-CN" altLang="en-US" dirty="0" smtClean="0"/>
+              <a:t>模块</a:t>
+            </a:r>
+            <a:endParaRPr lang="en-US" altLang="zh-CN" dirty="0"/>
+          </a:p>
+          <a:p>
+            <a:pPr lvl="1"/>
+            <a:r>
+              <a:rPr lang="en-US" altLang="zh-CN" dirty="0" smtClean="0"/>
+              <a:t>Script</a:t>
+            </a:r>
+            <a:r>
+              <a:rPr lang="zh-CN" altLang="en-US" dirty="0" smtClean="0"/>
+              <a:t>模块有哪些不足</a:t>
+            </a:r>
+            <a:endParaRPr lang="en-US" altLang="zh-CN" dirty="0" smtClean="0"/>
+          </a:p>
+          <a:p>
+            <a:pPr lvl="2"/>
+            <a:r>
+              <a:rPr lang="zh-CN" altLang="en-US" sz="2200" dirty="0">
+                <a:latin typeface="+mn-ea"/>
+              </a:rPr>
+              <a:t>希望可以获取返回值</a:t>
+            </a:r>
+          </a:p>
+          <a:p>
+            <a:pPr lvl="2"/>
+            <a:r>
+              <a:rPr lang="zh-CN" altLang="en-US" dirty="0" smtClean="0">
+                <a:latin typeface="+mn-ea"/>
+              </a:rPr>
+              <a:t>需要对返回值进行判断处理</a:t>
+            </a:r>
+          </a:p>
+          <a:p>
+            <a:pPr lvl="2"/>
+            <a:r>
+              <a:rPr lang="zh-CN" altLang="en-US" dirty="0" smtClean="0">
+                <a:latin typeface="+mj-ea"/>
+                <a:ea typeface="+mj-ea"/>
+              </a:rPr>
+              <a:t>需要比较复杂的参数，例如传入</a:t>
+            </a:r>
+            <a:r>
+              <a:rPr lang="en-US" altLang="zh-CN" dirty="0" err="1" smtClean="0">
+                <a:latin typeface="+mj-ea"/>
+                <a:ea typeface="+mj-ea"/>
+              </a:rPr>
+              <a:t>json</a:t>
+            </a:r>
+            <a:r>
+              <a:rPr lang="zh-CN" altLang="en-US" dirty="0" smtClean="0">
+                <a:latin typeface="+mj-ea"/>
+                <a:ea typeface="+mj-ea"/>
+              </a:rPr>
+              <a:t>字符串，对字符串进行分析</a:t>
+            </a:r>
+            <a:endParaRPr lang="en-US" altLang="zh-CN" dirty="0" smtClean="0">
+              <a:latin typeface="+mj-ea"/>
+              <a:ea typeface="+mj-ea"/>
+            </a:endParaRPr>
+          </a:p>
+          <a:p>
+            <a:r>
+              <a:rPr lang="zh-CN" altLang="en-US" dirty="0" smtClean="0"/>
+              <a:t>怎样开发自己的</a:t>
+            </a:r>
             <a:r>
               <a:rPr lang="en-US" altLang="zh-CN" dirty="0" err="1" smtClean="0"/>
               <a:t>Ansible</a:t>
@@ -7382,109 +7934,38 @@
               <a:rPr lang="en-US" altLang="zh-CN" dirty="0" smtClean="0"/>
               <a:t> Module</a:t>
             </a:r>
-            <a:endParaRPr lang="en-US" dirty="0"/>
-          </a:p>
-        </p:txBody>
-      </p:sp>
-      <p:sp>
-        <p:nvSpPr>
-          <p:cNvPr id="3" name="内容占位符 2"/>
-          <p:cNvSpPr>
-            <a:spLocks noGrp="1"/>
-          </p:cNvSpPr>
-          <p:nvPr>
-            <p:ph idx="1"/>
-          </p:nvPr>
-        </p:nvSpPr>
-        <p:spPr>
-          <a:noFill/>
-        </p:spPr>
-        <p:txBody>
-          <a:bodyPr/>
-          <a:lstStyle/>
-          <a:p>
+          </a:p>
+          <a:p>
+            <a:pPr marL="457200" lvl="1" indent="0">
+              <a:buNone/>
+            </a:pPr>
+            <a:r>
+              <a:rPr lang="en-US" altLang="zh-CN" dirty="0" smtClean="0"/>
+              <a:t>1</a:t>
+            </a:r>
+            <a:r>
+              <a:rPr lang="en-US" altLang="zh-CN" dirty="0" smtClean="0"/>
+              <a:t>. </a:t>
+            </a:r>
             <a:r>
               <a:rPr lang="zh-CN" altLang="en-US" dirty="0" smtClean="0"/>
-              <a:t>为什么要</a:t>
+              <a:t>使用</a:t>
             </a:r>
             <a:r>
               <a:rPr lang="en-US" altLang="zh-CN" dirty="0" smtClean="0"/>
-              <a:t>(</a:t>
-            </a:r>
-            <a:r>
-              <a:rPr lang="zh-CN" altLang="en-US" dirty="0" smtClean="0"/>
-              <a:t>是否有必要</a:t>
-            </a:r>
-            <a:r>
-              <a:rPr lang="en-US" altLang="zh-CN" dirty="0" smtClean="0"/>
-              <a:t>)</a:t>
+              <a:t>shell </a:t>
             </a:r>
             <a:r>
               <a:rPr lang="zh-CN" altLang="en-US" dirty="0" smtClean="0"/>
               <a:t>开发自己的</a:t>
             </a:r>
             <a:r>
-              <a:rPr lang="en-US" altLang="zh-CN" dirty="0" err="1"/>
-              <a:t>A</a:t>
-            </a:r>
-            <a:r>
-              <a:rPr lang="en-US" altLang="zh-CN" dirty="0" err="1" smtClean="0"/>
-              <a:t>nsible</a:t>
-            </a:r>
-            <a:r>
-              <a:rPr lang="en-US" altLang="zh-CN" dirty="0" smtClean="0"/>
-              <a:t> Module</a:t>
-            </a:r>
-          </a:p>
-          <a:p>
-            <a:r>
-              <a:rPr lang="zh-CN" altLang="en-US" dirty="0" smtClean="0"/>
-              <a:t>怎样开发自己的</a:t>
-            </a:r>
-            <a:r>
-              <a:rPr lang="en-US" altLang="zh-CN" dirty="0" err="1" smtClean="0"/>
-              <a:t>Ansible</a:t>
-            </a:r>
-            <a:r>
-              <a:rPr lang="en-US" altLang="zh-CN" dirty="0" smtClean="0"/>
-              <a:t> Module</a:t>
-            </a:r>
-          </a:p>
-          <a:p>
-            <a:pPr marL="457200" lvl="1" indent="0">
-              <a:buNone/>
-            </a:pPr>
-            <a:r>
-              <a:rPr lang="en-US" altLang="zh-CN" dirty="0" smtClean="0"/>
-              <a:t>1. </a:t>
-            </a:r>
-            <a:r>
-              <a:rPr lang="zh-CN" altLang="en-US" dirty="0" smtClean="0"/>
-              <a:t>使用</a:t>
-            </a:r>
-            <a:r>
-              <a:rPr lang="en-US" altLang="zh-CN" dirty="0" smtClean="0"/>
-              <a:t>shell </a:t>
-            </a:r>
-            <a:r>
-              <a:rPr lang="zh-CN" altLang="en-US" dirty="0" smtClean="0"/>
-              <a:t>开发自己的</a:t>
-            </a:r>
-            <a:r>
               <a:rPr lang="en-US" altLang="zh-CN" dirty="0" smtClean="0"/>
               <a:t>Module</a:t>
             </a:r>
             <a:r>
               <a:rPr lang="zh-CN" altLang="en-US" dirty="0" smtClean="0"/>
-              <a:t>，用</a:t>
-            </a:r>
-            <a:r>
-              <a:rPr lang="en-US" altLang="zh-CN" dirty="0" smtClean="0"/>
-              <a:t>script</a:t>
-            </a:r>
-            <a:r>
-              <a:rPr lang="zh-CN" altLang="en-US" dirty="0" smtClean="0"/>
-              <a:t>模块代替</a:t>
+              <a:t>，以及</a:t>
             </a:r>
             <a:r>
               <a:rPr lang="en-US" altLang="zh-CN" dirty="0" smtClean="0"/>
@@ -7492,7 +7973,15 @@
             </a:r>
             <a:r>
               <a:rPr lang="zh-CN" altLang="en-US" dirty="0" smtClean="0"/>
-              <a:t>开发的模块</a:t>
+              <a:t>开发</a:t>
+            </a:r>
+            <a:r>
+              <a:rPr lang="en-US" altLang="zh-CN" dirty="0" smtClean="0"/>
+              <a:t>Module</a:t>
+            </a:r>
+            <a:r>
+              <a:rPr lang="zh-CN" altLang="en-US" dirty="0" smtClean="0"/>
+              <a:t>有哪些不足</a:t>
             </a:r>
             <a:endParaRPr lang="en-US" altLang="zh-CN" dirty="0" smtClean="0"/>
           </a:p>
@@ -7624,10 +8113,17 @@
   <p:clrMapOvr>
     <a:masterClrMapping/>
   </p:clrMapOvr>
+  <p:timing>
+    <p:tnLst>
+      <p:par>
+        <p:cTn id="1" dur="indefinite" restart="never" nodeType="tmRoot"/>
+      </p:par>
+    </p:tnLst>
+  </p:timing>
 </p:sld>
 </file>
 
-<file path=ppt/slides/slide7.xml><?xml version="1.0" encoding="utf-8"?>
+<file path=ppt/slides/slide6.xml><?xml version="1.0" encoding="utf-8"?>
 <p:sld xmlns:a="http://schemas.openxmlformats.org/drawingml/2006/main" xmlns:r="http://schemas.openxmlformats.org/officeDocument/2006/relationships" xmlns:p="http://schemas.openxmlformats.org/presentationml/2006/main">
   <p:cSld>
     <p:bg>
@@ -7669,22 +8165,22 @@
           <a:p>
             <a:pPr algn="ctr"/>
             <a:r>
-              <a:rPr lang="en-US" altLang="zh-CN" dirty="0" err="1" smtClean="0"/>
+              <a:rPr lang="en-US" altLang="zh-CN" b="1" dirty="0" err="1" smtClean="0"/>
               <a:t>Ansible</a:t>
             </a:r>
             <a:r>
-              <a:rPr lang="en-US" altLang="zh-CN" dirty="0" smtClean="0"/>
+              <a:rPr lang="en-US" altLang="zh-CN" b="1" dirty="0" smtClean="0"/>
               <a:t> </a:t>
             </a:r>
             <a:r>
-              <a:rPr lang="en-US" altLang="zh-CN" dirty="0"/>
+              <a:rPr lang="en-US" altLang="zh-CN" b="1" dirty="0"/>
               <a:t>Python </a:t>
             </a:r>
             <a:r>
-              <a:rPr lang="en-US" altLang="zh-CN" dirty="0" smtClean="0"/>
+              <a:rPr lang="en-US" altLang="zh-CN" b="1" dirty="0" smtClean="0"/>
               <a:t>API</a:t>
             </a:r>
-            <a:endParaRPr lang="en-US" dirty="0"/>
+            <a:endParaRPr lang="en-US" b="1" dirty="0"/>
           </a:p>
         </p:txBody>
       </p:sp>
@@ -7705,12 +8201,14 @@
           </a:xfrm>
         </p:spPr>
         <p:txBody>
-          <a:bodyPr/>
+          <a:bodyPr>
+            <a:normAutofit fontScale="92500" lnSpcReduction="20000"/>
+          </a:bodyPr>
           <a:lstStyle/>
           <a:p>
             <a:r>
               <a:rPr lang="zh-CN" altLang="en-US" dirty="0" smtClean="0"/>
-              <a:t>为什么使用</a:t>
+              <a:t>什么是</a:t>
             </a:r>
             <a:r>
               <a:rPr lang="en-US" altLang="zh-CN" dirty="0" err="1" smtClean="0"/>
@@ -7718,13 +8216,63 @@
             </a:r>
             <a:r>
               <a:rPr lang="en-US" altLang="zh-CN" dirty="0" smtClean="0"/>
+              <a:t> </a:t>
+            </a:r>
+            <a:r>
+              <a:rPr lang="en-US" altLang="zh-CN" dirty="0" smtClean="0"/>
+              <a:t>Python </a:t>
+            </a:r>
+            <a:r>
+              <a:rPr lang="en-US" altLang="zh-CN" dirty="0" smtClean="0"/>
+              <a:t>API</a:t>
+            </a:r>
+          </a:p>
+          <a:p>
+            <a:pPr marL="457200" lvl="1" indent="0">
+              <a:buNone/>
+            </a:pPr>
+            <a:r>
+              <a:rPr lang="en-US" dirty="0" err="1"/>
+              <a:t>Ansible</a:t>
+            </a:r>
+            <a:r>
+              <a:rPr lang="en-US" dirty="0"/>
               <a:t> Python API</a:t>
             </a:r>
+            <a:r>
+              <a:rPr lang="zh-CN" altLang="en-US" dirty="0"/>
+              <a:t>是一组用</a:t>
+            </a:r>
+            <a:r>
+              <a:rPr lang="en-US" dirty="0"/>
+              <a:t>python</a:t>
+            </a:r>
+            <a:r>
+              <a:rPr lang="zh-CN" altLang="en-US" dirty="0"/>
+              <a:t>编写的类和函数，便于使用</a:t>
+            </a:r>
+            <a:r>
+              <a:rPr lang="en-US" dirty="0"/>
+              <a:t>python</a:t>
+            </a:r>
+            <a:r>
+              <a:rPr lang="zh-CN" altLang="en-US" dirty="0"/>
+              <a:t>程序调用</a:t>
+            </a:r>
+            <a:r>
+              <a:rPr lang="en-US" dirty="0" err="1"/>
+              <a:t>Ansible</a:t>
+            </a:r>
+            <a:r>
+              <a:rPr lang="zh-CN" altLang="en-US" dirty="0"/>
+              <a:t>的核心功能</a:t>
+            </a:r>
+            <a:endParaRPr lang="en-US" altLang="zh-CN" dirty="0" smtClean="0"/>
           </a:p>
           <a:p>
             <a:r>
               <a:rPr lang="zh-CN" altLang="en-US" dirty="0" smtClean="0"/>
-              <a:t>如何使用</a:t>
+              <a:t>为什么要使用</a:t>
             </a:r>
             <a:r>
               <a:rPr lang="en-US" altLang="zh-CN" dirty="0" err="1"/>
@@ -7732,13 +8280,105 @@
             </a:r>
             <a:r>
               <a:rPr lang="en-US" altLang="zh-CN" dirty="0"/>
-              <a:t> Python API</a:t>
-            </a:r>
-          </a:p>
-          <a:p>
-            <a:pPr marL="914400" lvl="1" indent="-457200">
-              <a:buAutoNum type="arabicPeriod"/>
-            </a:pPr>
+              <a:t> Python </a:t>
+            </a:r>
+            <a:r>
+              <a:rPr lang="en-US" altLang="zh-CN" dirty="0" smtClean="0"/>
+              <a:t>API</a:t>
+            </a:r>
+          </a:p>
+          <a:p>
+            <a:pPr lvl="1"/>
+            <a:r>
+              <a:rPr lang="zh-CN" altLang="en-US" dirty="0" smtClean="0"/>
+              <a:t>前</a:t>
+            </a:r>
+            <a:r>
+              <a:rPr lang="zh-CN" altLang="en-US" dirty="0"/>
+              <a:t>一次的执行结果作为后一次任务的参数</a:t>
+            </a:r>
+            <a:r>
+              <a:rPr lang="zh-CN" altLang="en-US" dirty="0" smtClean="0"/>
+              <a:t>输入</a:t>
+            </a:r>
+            <a:endParaRPr lang="en-US" altLang="zh-CN" dirty="0" smtClean="0"/>
+          </a:p>
+          <a:p>
+            <a:pPr lvl="1"/>
+            <a:r>
+              <a:rPr lang="zh-CN" altLang="en-US" dirty="0" smtClean="0"/>
+              <a:t>对</a:t>
+            </a:r>
+            <a:r>
+              <a:rPr lang="zh-CN" altLang="en-US" dirty="0"/>
+              <a:t>任务的执行结果进行定制化输出或者存储（引入一下</a:t>
+            </a:r>
+            <a:r>
+              <a:rPr lang="en-US" altLang="zh-CN" dirty="0"/>
+              <a:t>callback plugin</a:t>
+            </a:r>
+            <a:r>
+              <a:rPr lang="zh-CN" altLang="en-US" dirty="0" smtClean="0"/>
+              <a:t>）</a:t>
+            </a:r>
+            <a:endParaRPr lang="en-US" altLang="zh-CN" dirty="0" smtClean="0"/>
+          </a:p>
+          <a:p>
+            <a:pPr lvl="1"/>
+            <a:r>
+              <a:rPr lang="zh-CN" altLang="en-US" dirty="0" smtClean="0"/>
+              <a:t>方便</a:t>
+            </a:r>
+            <a:r>
+              <a:rPr lang="zh-CN" altLang="en-US" dirty="0"/>
+              <a:t>其他程序调用</a:t>
+            </a:r>
+            <a:r>
+              <a:rPr lang="en-US" altLang="zh-CN" dirty="0" err="1"/>
+              <a:t>ansible</a:t>
+            </a:r>
+            <a:r>
+              <a:rPr lang="zh-CN" altLang="en-US" dirty="0"/>
+              <a:t>的核心功能</a:t>
+            </a:r>
+            <a:endParaRPr lang="en-US" altLang="zh-CN" dirty="0" smtClean="0"/>
+          </a:p>
+          <a:p>
+            <a:r>
+              <a:rPr lang="en-US" altLang="zh-CN" dirty="0" err="1" smtClean="0"/>
+              <a:t>Ansible</a:t>
+            </a:r>
+            <a:r>
+              <a:rPr lang="en-US" altLang="zh-CN" dirty="0" smtClean="0"/>
+              <a:t> </a:t>
+            </a:r>
+            <a:r>
+              <a:rPr lang="en-US" altLang="zh-CN" dirty="0"/>
+              <a:t>Python API </a:t>
+            </a:r>
+            <a:r>
+              <a:rPr lang="zh-CN" altLang="en-US" dirty="0"/>
+              <a:t>的调用</a:t>
+            </a:r>
+            <a:r>
+              <a:rPr lang="zh-CN" altLang="en-US" dirty="0" smtClean="0"/>
+              <a:t>流程</a:t>
+            </a:r>
+            <a:endParaRPr lang="en-US" altLang="zh-CN" dirty="0" smtClean="0"/>
+          </a:p>
+          <a:p>
+            <a:pPr lvl="1"/>
+            <a:r>
+              <a:rPr lang="zh-CN" altLang="en-US" dirty="0" smtClean="0"/>
+              <a:t>配合下图和代码讲解调用流程</a:t>
+            </a:r>
+            <a:endParaRPr lang="en-US" altLang="zh-CN" dirty="0" smtClean="0"/>
+          </a:p>
+          <a:p>
+            <a:r>
+              <a:rPr lang="zh-CN" altLang="en-US" dirty="0"/>
+              <a:t>如何</a:t>
+            </a:r>
             <a:r>
               <a:rPr lang="zh-CN" altLang="en-US" dirty="0" smtClean="0"/>
               <a:t>使用</a:t>
@@ -7749,98 +8389,80 @@
             </a:r>
             <a:r>
               <a:rPr lang="en-US" altLang="zh-CN" dirty="0"/>
-              <a:t> </a:t>
+              <a:t> Python API</a:t>
+            </a:r>
+          </a:p>
+          <a:p>
+            <a:pPr lvl="1"/>
+            <a:r>
+              <a:rPr lang="zh-CN" altLang="en-US" dirty="0"/>
+              <a:t>使用</a:t>
+            </a:r>
+            <a:r>
+              <a:rPr lang="en-US" altLang="zh-CN" dirty="0" err="1"/>
+              <a:t>Ansible</a:t>
+            </a:r>
+            <a:r>
+              <a:rPr lang="en-US" altLang="zh-CN" dirty="0"/>
+              <a:t> Python API</a:t>
+            </a:r>
+            <a:r>
+              <a:rPr lang="zh-CN" altLang="en-US" dirty="0"/>
+              <a:t>运行</a:t>
+            </a:r>
+            <a:r>
+              <a:rPr lang="en-US" altLang="zh-CN" dirty="0"/>
+              <a:t>ad-hoc </a:t>
             </a:r>
             <a:r>
               <a:rPr lang="en-US" altLang="zh-CN" dirty="0" smtClean="0"/>
-              <a:t>Python API</a:t>
-            </a:r>
-            <a:r>
-              <a:rPr lang="zh-CN" altLang="en-US" dirty="0" smtClean="0"/>
-              <a:t>运行</a:t>
-            </a:r>
-            <a:r>
-              <a:rPr lang="en-US" altLang="zh-CN" dirty="0" smtClean="0"/>
-              <a:t>playbook</a:t>
-            </a:r>
-          </a:p>
-          <a:p>
-            <a:pPr marL="914400" lvl="1" indent="-457200">
-              <a:buAutoNum type="arabicPeriod"/>
-            </a:pPr>
+              <a:t>task</a:t>
+            </a:r>
+            <a:endParaRPr lang="en-US" altLang="zh-CN" dirty="0" smtClean="0"/>
+          </a:p>
+          <a:p>
+            <a:pPr lvl="1"/>
             <a:r>
               <a:rPr lang="zh-CN" altLang="en-US" dirty="0" smtClean="0"/>
               <a:t>使用</a:t>
             </a:r>
             <a:r>
+              <a:rPr lang="en-US" altLang="zh-CN" dirty="0" smtClean="0"/>
+              <a:t>Callback Plugin</a:t>
+            </a:r>
+            <a:r>
+              <a:rPr lang="zh-CN" altLang="en-US" dirty="0" smtClean="0"/>
+              <a:t>对返回值进行处理</a:t>
+            </a:r>
+            <a:endParaRPr lang="en-US" altLang="zh-CN" dirty="0" smtClean="0"/>
+          </a:p>
+          <a:p>
+            <a:pPr lvl="1"/>
+            <a:r>
+              <a:rPr lang="zh-CN" altLang="en-US" dirty="0"/>
+              <a:t>使用</a:t>
+            </a:r>
+            <a:r>
               <a:rPr lang="en-US" altLang="zh-CN" dirty="0" err="1"/>
               <a:t>Ansible</a:t>
             </a:r>
             <a:r>
               <a:rPr lang="en-US" altLang="zh-CN" dirty="0"/>
-              <a:t> Python </a:t>
-            </a:r>
-            <a:r>
-              <a:rPr lang="en-US" altLang="zh-CN" dirty="0" smtClean="0"/>
-              <a:t>API</a:t>
-            </a:r>
-            <a:r>
-              <a:rPr lang="zh-CN" altLang="en-US" dirty="0" smtClean="0"/>
+              <a:t> Python API</a:t>
+            </a:r>
+            <a:r>
+              <a:rPr lang="zh-CN" altLang="en-US" dirty="0"/>
               <a:t>运行</a:t>
             </a:r>
             <a:r>
-              <a:rPr lang="en-US" altLang="zh-CN" dirty="0" smtClean="0"/>
-              <a:t>ad-hoc task</a:t>
-            </a:r>
-          </a:p>
-          <a:p>
-            <a:r>
-              <a:rPr lang="zh-CN" altLang="en-US" dirty="0" smtClean="0"/>
-              <a:t>使用</a:t>
-            </a:r>
-            <a:r>
-              <a:rPr lang="en-US" altLang="zh-CN" dirty="0" err="1"/>
-              <a:t>Ansible</a:t>
-            </a:r>
-            <a:r>
               <a:rPr lang="en-US" altLang="zh-CN" dirty="0"/>
-              <a:t> Python API</a:t>
-            </a:r>
-            <a:r>
-              <a:rPr lang="zh-CN" altLang="en-US" dirty="0" smtClean="0"/>
-              <a:t>脚本运行后，相对简单的返回值</a:t>
-            </a:r>
-            <a:endParaRPr lang="en-US" altLang="zh-CN" dirty="0" smtClean="0"/>
-          </a:p>
-          <a:p>
-            <a:r>
-              <a:rPr lang="zh-CN" altLang="en-US" dirty="0" smtClean="0"/>
-              <a:t>提一下使用</a:t>
-            </a:r>
-            <a:r>
-              <a:rPr lang="en-US" altLang="zh-CN" dirty="0" smtClean="0"/>
-              <a:t>Callback Plugin</a:t>
-            </a:r>
-            <a:r>
-              <a:rPr lang="zh-CN" altLang="en-US" dirty="0"/>
-              <a:t>可以</a:t>
-            </a:r>
-            <a:r>
-              <a:rPr lang="zh-CN" altLang="en-US" dirty="0" smtClean="0"/>
-              <a:t>对</a:t>
-            </a:r>
-            <a:r>
-              <a:rPr lang="en-US" altLang="zh-CN" dirty="0" err="1"/>
-              <a:t>Ansible</a:t>
-            </a:r>
-            <a:r>
-              <a:rPr lang="en-US" altLang="zh-CN" dirty="0"/>
-              <a:t> Python</a:t>
-            </a:r>
-            <a:r>
-              <a:rPr lang="zh-CN" altLang="en-US" dirty="0" smtClean="0"/>
-              <a:t>运行后的返回值进行处理</a:t>
-            </a:r>
+              <a:t>playbook</a:t>
+            </a:r>
+          </a:p>
+          <a:p>
+            <a:pPr marL="457200" lvl="1" indent="0">
+              <a:buNone/>
+            </a:pPr>
             <a:endParaRPr lang="en-US" altLang="zh-CN" dirty="0" smtClean="0"/>
           </a:p>
         </p:txBody>
@@ -7854,7 +8476,7 @@
           <p:nvPr/>
         </p:nvPicPr>
         <p:blipFill>
-          <a:blip r:embed="rId2">
+          <a:blip r:embed="rId3">
             <a:extLst>
               <a:ext uri="{28A0092B-C50C-407E-A947-70E740481C1C}">
                 <a14:useLocalDpi xmlns:a14="http://schemas.microsoft.com/office/drawing/2010/main" val="0"/>
@@ -7906,7 +8528,7 @@
 </p:sld>
 </file>
 
-<file path=ppt/slides/slide8.xml><?xml version="1.0" encoding="utf-8"?>
+<file path=ppt/slides/slide7.xml><?xml version="1.0" encoding="utf-8"?>
 <p:sld xmlns:a="http://schemas.openxmlformats.org/drawingml/2006/main" xmlns:r="http://schemas.openxmlformats.org/officeDocument/2006/relationships" xmlns:p="http://schemas.openxmlformats.org/presentationml/2006/main">
   <p:cSld>
     <p:spTree>
@@ -7923,1266 +8545,30 @@
           <a:chExt cx="0" cy="0"/>
         </a:xfrm>
       </p:grpSpPr>
-      <p:sp>
-        <p:nvSpPr>
-          <p:cNvPr id="4" name="矩形 3"/>
-          <p:cNvSpPr/>
+      <p:pic>
+        <p:nvPicPr>
+          <p:cNvPr id="55" name="图片 54"/>
+          <p:cNvPicPr>
+            <a:picLocks noChangeAspect="1"/>
+          </p:cNvPicPr>
           <p:nvPr/>
-        </p:nvSpPr>
+        </p:nvPicPr>
+        <p:blipFill>
+          <a:blip r:embed="rId2"/>
+          <a:stretch>
+            <a:fillRect/>
+          </a:stretch>
+        </p:blipFill>
         <p:spPr>
           <a:xfrm>
-            <a:off x="5361710" y="864173"/>
-            <a:ext cx="1532401" cy="699657"/>
+            <a:off x="1941232" y="1303682"/>
+            <a:ext cx="8919147" cy="4908508"/>
           </a:xfrm>
           <a:prstGeom prst="rect">
             <a:avLst/>
           </a:prstGeom>
         </p:spPr>
-        <p:style>
-          <a:lnRef idx="2">
-            <a:schemeClr val="accent1">
-              <a:shade val="50000"/>
-            </a:schemeClr>
-          </a:lnRef>
-          <a:fillRef idx="1">
-            <a:schemeClr val="accent1"/>
-          </a:fillRef>
-          <a:effectRef idx="0">
-            <a:schemeClr val="accent1"/>
-          </a:effectRef>
-          <a:fontRef idx="minor">
-            <a:schemeClr val="lt1"/>
-          </a:fontRef>
-        </p:style>
-        <p:txBody>
-          <a:bodyPr rtlCol="0" anchor="ctr"/>
-          <a:lstStyle/>
-          <a:p>
-            <a:pPr algn="ctr"/>
-            <a:r>
-              <a:rPr lang="en-US" dirty="0" smtClean="0">
-                <a:solidFill>
-                  <a:prstClr val="white"/>
-                </a:solidFill>
-              </a:rPr>
-              <a:t>Inventory </a:t>
-            </a:r>
-            <a:r>
-              <a:rPr lang="en-US" dirty="0" err="1" smtClean="0">
-                <a:solidFill>
-                  <a:prstClr val="white"/>
-                </a:solidFill>
-              </a:rPr>
-              <a:t>Init</a:t>
-            </a:r>
-            <a:endParaRPr lang="en-US" dirty="0" smtClean="0">
-              <a:solidFill>
-                <a:prstClr val="white"/>
-              </a:solidFill>
-            </a:endParaRPr>
-          </a:p>
-        </p:txBody>
-      </p:sp>
-      <p:sp>
-        <p:nvSpPr>
-          <p:cNvPr id="5" name="矩形 4"/>
-          <p:cNvSpPr/>
-          <p:nvPr/>
-        </p:nvSpPr>
-        <p:spPr>
-          <a:xfrm>
-            <a:off x="7729366" y="888420"/>
-            <a:ext cx="1533600" cy="698400"/>
-          </a:xfrm>
-          <a:prstGeom prst="rect">
-            <a:avLst/>
-          </a:prstGeom>
-        </p:spPr>
-        <p:style>
-          <a:lnRef idx="2">
-            <a:schemeClr val="accent1">
-              <a:shade val="50000"/>
-            </a:schemeClr>
-          </a:lnRef>
-          <a:fillRef idx="1">
-            <a:schemeClr val="accent1"/>
-          </a:fillRef>
-          <a:effectRef idx="0">
-            <a:schemeClr val="accent1"/>
-          </a:effectRef>
-          <a:fontRef idx="minor">
-            <a:schemeClr val="lt1"/>
-          </a:fontRef>
-        </p:style>
-        <p:txBody>
-          <a:bodyPr rtlCol="0" anchor="ctr"/>
-          <a:lstStyle/>
-          <a:p>
-            <a:pPr algn="ctr"/>
-            <a:r>
-              <a:rPr lang="en-US" altLang="zh-CN" dirty="0" smtClean="0">
-                <a:solidFill>
-                  <a:prstClr val="white"/>
-                </a:solidFill>
-              </a:rPr>
-              <a:t>Play </a:t>
-            </a:r>
-            <a:r>
-              <a:rPr lang="en-US" altLang="zh-CN" dirty="0" err="1" smtClean="0">
-                <a:solidFill>
-                  <a:prstClr val="white"/>
-                </a:solidFill>
-              </a:rPr>
-              <a:t>init</a:t>
-            </a:r>
-            <a:endParaRPr lang="en-US" dirty="0" smtClean="0">
-              <a:solidFill>
-                <a:prstClr val="white"/>
-              </a:solidFill>
-            </a:endParaRPr>
-          </a:p>
-        </p:txBody>
-      </p:sp>
-      <p:sp>
-        <p:nvSpPr>
-          <p:cNvPr id="6" name="矩形 5"/>
-          <p:cNvSpPr/>
-          <p:nvPr/>
-        </p:nvSpPr>
-        <p:spPr>
-          <a:xfrm>
-            <a:off x="5292436" y="2888673"/>
-            <a:ext cx="4128656" cy="574962"/>
-          </a:xfrm>
-          <a:prstGeom prst="rect">
-            <a:avLst/>
-          </a:prstGeom>
-          <a:ln>
-            <a:noFill/>
-          </a:ln>
-        </p:spPr>
-        <p:style>
-          <a:lnRef idx="2">
-            <a:schemeClr val="accent1">
-              <a:shade val="50000"/>
-            </a:schemeClr>
-          </a:lnRef>
-          <a:fillRef idx="1">
-            <a:schemeClr val="accent1"/>
-          </a:fillRef>
-          <a:effectRef idx="0">
-            <a:schemeClr val="accent1"/>
-          </a:effectRef>
-          <a:fontRef idx="minor">
-            <a:schemeClr val="lt1"/>
-          </a:fontRef>
-        </p:style>
-        <p:txBody>
-          <a:bodyPr rtlCol="0" anchor="ctr"/>
-          <a:lstStyle/>
-          <a:p>
-            <a:pPr algn="ctr"/>
-            <a:r>
-              <a:rPr lang="en-US" dirty="0" err="1" smtClean="0">
-                <a:solidFill>
-                  <a:prstClr val="white"/>
-                </a:solidFill>
-              </a:rPr>
-              <a:t>Ansible</a:t>
-            </a:r>
-            <a:r>
-              <a:rPr lang="en-US" dirty="0" smtClean="0">
-                <a:solidFill>
-                  <a:prstClr val="white"/>
-                </a:solidFill>
-              </a:rPr>
-              <a:t> </a:t>
-            </a:r>
-            <a:r>
-              <a:rPr lang="zh-CN" altLang="en-US" dirty="0" smtClean="0">
-                <a:solidFill>
-                  <a:prstClr val="white"/>
-                </a:solidFill>
-              </a:rPr>
-              <a:t>执行</a:t>
-            </a:r>
-            <a:endParaRPr lang="en-US" dirty="0" smtClean="0">
-              <a:solidFill>
-                <a:prstClr val="white"/>
-              </a:solidFill>
-            </a:endParaRPr>
-          </a:p>
-        </p:txBody>
-      </p:sp>
-      <p:sp>
-        <p:nvSpPr>
-          <p:cNvPr id="8" name="椭圆 7"/>
-          <p:cNvSpPr/>
-          <p:nvPr/>
-        </p:nvSpPr>
-        <p:spPr>
-          <a:xfrm>
-            <a:off x="1949986" y="1810517"/>
-            <a:ext cx="2428052" cy="590400"/>
-          </a:xfrm>
-          <a:prstGeom prst="ellipse">
-            <a:avLst/>
-          </a:prstGeom>
-          <a:ln>
-            <a:noFill/>
-          </a:ln>
-        </p:spPr>
-        <p:style>
-          <a:lnRef idx="2">
-            <a:schemeClr val="accent1">
-              <a:shade val="50000"/>
-            </a:schemeClr>
-          </a:lnRef>
-          <a:fillRef idx="1">
-            <a:schemeClr val="accent1"/>
-          </a:fillRef>
-          <a:effectRef idx="0">
-            <a:schemeClr val="accent1"/>
-          </a:effectRef>
-          <a:fontRef idx="minor">
-            <a:schemeClr val="lt1"/>
-          </a:fontRef>
-        </p:style>
-        <p:txBody>
-          <a:bodyPr rtlCol="0" anchor="ctr"/>
-          <a:lstStyle/>
-          <a:p>
-            <a:pPr algn="ctr"/>
-            <a:r>
-              <a:rPr lang="en-US" dirty="0" err="1" smtClean="0">
-                <a:solidFill>
-                  <a:prstClr val="white"/>
-                </a:solidFill>
-              </a:rPr>
-              <a:t>Dataloader</a:t>
-            </a:r>
-            <a:r>
-              <a:rPr lang="en-US" dirty="0" smtClean="0">
-                <a:solidFill>
-                  <a:prstClr val="white"/>
-                </a:solidFill>
-              </a:rPr>
-              <a:t> </a:t>
-            </a:r>
-          </a:p>
-        </p:txBody>
-      </p:sp>
-      <p:sp>
-        <p:nvSpPr>
-          <p:cNvPr id="9" name="椭圆 8"/>
-          <p:cNvSpPr/>
-          <p:nvPr/>
-        </p:nvSpPr>
-        <p:spPr>
-          <a:xfrm>
-            <a:off x="1949985" y="3081068"/>
-            <a:ext cx="2430000" cy="590400"/>
-          </a:xfrm>
-          <a:prstGeom prst="ellipse">
-            <a:avLst/>
-          </a:prstGeom>
-          <a:ln>
-            <a:noFill/>
-          </a:ln>
-        </p:spPr>
-        <p:style>
-          <a:lnRef idx="2">
-            <a:schemeClr val="accent1">
-              <a:shade val="50000"/>
-            </a:schemeClr>
-          </a:lnRef>
-          <a:fillRef idx="1">
-            <a:schemeClr val="accent1"/>
-          </a:fillRef>
-          <a:effectRef idx="0">
-            <a:schemeClr val="accent1"/>
-          </a:effectRef>
-          <a:fontRef idx="minor">
-            <a:schemeClr val="lt1"/>
-          </a:fontRef>
-        </p:style>
-        <p:txBody>
-          <a:bodyPr rtlCol="0" anchor="ctr"/>
-          <a:lstStyle/>
-          <a:p>
-            <a:pPr algn="ctr"/>
-            <a:r>
-              <a:rPr lang="en-US" dirty="0" smtClean="0">
-                <a:solidFill>
-                  <a:prstClr val="white"/>
-                </a:solidFill>
-              </a:rPr>
-              <a:t>Options</a:t>
-            </a:r>
-          </a:p>
-        </p:txBody>
-      </p:sp>
-      <p:cxnSp>
-        <p:nvCxnSpPr>
-          <p:cNvPr id="11" name="直接箭头连接符 10"/>
-          <p:cNvCxnSpPr/>
-          <p:nvPr/>
-        </p:nvCxnSpPr>
-        <p:spPr>
-          <a:xfrm flipH="1">
-            <a:off x="6248708" y="1477999"/>
-            <a:ext cx="13855" cy="1396714"/>
-          </a:xfrm>
-          <a:prstGeom prst="straightConnector1">
-            <a:avLst/>
-          </a:prstGeom>
-          <a:ln>
-            <a:tailEnd type="triangle"/>
-          </a:ln>
-        </p:spPr>
-        <p:style>
-          <a:lnRef idx="1">
-            <a:schemeClr val="accent1"/>
-          </a:lnRef>
-          <a:fillRef idx="0">
-            <a:schemeClr val="accent1"/>
-          </a:fillRef>
-          <a:effectRef idx="0">
-            <a:schemeClr val="accent1"/>
-          </a:effectRef>
-          <a:fontRef idx="minor">
-            <a:schemeClr val="tx1"/>
-          </a:fontRef>
-        </p:style>
-      </p:cxnSp>
-      <p:cxnSp>
-        <p:nvCxnSpPr>
-          <p:cNvPr id="13" name="直接箭头连接符 12"/>
-          <p:cNvCxnSpPr>
-            <a:stCxn id="72" idx="6"/>
-            <a:endCxn id="4" idx="1"/>
-          </p:cNvCxnSpPr>
-          <p:nvPr/>
-        </p:nvCxnSpPr>
-        <p:spPr>
-          <a:xfrm flipV="1">
-            <a:off x="4379984" y="1214002"/>
-            <a:ext cx="981726" cy="111096"/>
-          </a:xfrm>
-          <a:prstGeom prst="straightConnector1">
-            <a:avLst/>
-          </a:prstGeom>
-          <a:ln>
-            <a:tailEnd type="triangle"/>
-          </a:ln>
-        </p:spPr>
-        <p:style>
-          <a:lnRef idx="1">
-            <a:schemeClr val="accent1"/>
-          </a:lnRef>
-          <a:fillRef idx="0">
-            <a:schemeClr val="accent1"/>
-          </a:fillRef>
-          <a:effectRef idx="0">
-            <a:schemeClr val="accent1"/>
-          </a:effectRef>
-          <a:fontRef idx="minor">
-            <a:schemeClr val="tx1"/>
-          </a:fontRef>
-        </p:style>
-      </p:cxnSp>
-      <p:cxnSp>
-        <p:nvCxnSpPr>
-          <p:cNvPr id="15" name="直接箭头连接符 14"/>
-          <p:cNvCxnSpPr/>
-          <p:nvPr/>
-        </p:nvCxnSpPr>
-        <p:spPr>
-          <a:xfrm flipV="1">
-            <a:off x="4211782" y="1599083"/>
-            <a:ext cx="1080654" cy="531055"/>
-          </a:xfrm>
-          <a:prstGeom prst="straightConnector1">
-            <a:avLst/>
-          </a:prstGeom>
-          <a:ln>
-            <a:tailEnd type="triangle"/>
-          </a:ln>
-        </p:spPr>
-        <p:style>
-          <a:lnRef idx="1">
-            <a:schemeClr val="accent1"/>
-          </a:lnRef>
-          <a:fillRef idx="0">
-            <a:schemeClr val="accent1"/>
-          </a:fillRef>
-          <a:effectRef idx="0">
-            <a:schemeClr val="accent1"/>
-          </a:effectRef>
-          <a:fontRef idx="minor">
-            <a:schemeClr val="tx1"/>
-          </a:fontRef>
-        </p:style>
-      </p:cxnSp>
-      <p:cxnSp>
-        <p:nvCxnSpPr>
-          <p:cNvPr id="21" name="直接箭头连接符 20"/>
-          <p:cNvCxnSpPr>
-            <a:stCxn id="5" idx="2"/>
-          </p:cNvCxnSpPr>
-          <p:nvPr/>
-        </p:nvCxnSpPr>
-        <p:spPr>
-          <a:xfrm>
-            <a:off x="8496166" y="1586820"/>
-            <a:ext cx="190636" cy="1356403"/>
-          </a:xfrm>
-          <a:prstGeom prst="straightConnector1">
-            <a:avLst/>
-          </a:prstGeom>
-          <a:ln>
-            <a:tailEnd type="triangle"/>
-          </a:ln>
-        </p:spPr>
-        <p:style>
-          <a:lnRef idx="1">
-            <a:schemeClr val="accent1"/>
-          </a:lnRef>
-          <a:fillRef idx="0">
-            <a:schemeClr val="accent1"/>
-          </a:fillRef>
-          <a:effectRef idx="0">
-            <a:schemeClr val="accent1"/>
-          </a:effectRef>
-          <a:fontRef idx="minor">
-            <a:schemeClr val="tx1"/>
-          </a:fontRef>
-        </p:style>
-      </p:cxnSp>
-      <p:cxnSp>
-        <p:nvCxnSpPr>
-          <p:cNvPr id="34" name="直接箭头连接符 33"/>
-          <p:cNvCxnSpPr/>
-          <p:nvPr/>
-        </p:nvCxnSpPr>
-        <p:spPr>
-          <a:xfrm>
-            <a:off x="10314616" y="1846606"/>
-            <a:ext cx="0" cy="0"/>
-          </a:xfrm>
-          <a:prstGeom prst="straightConnector1">
-            <a:avLst/>
-          </a:prstGeom>
-          <a:ln>
-            <a:tailEnd type="triangle"/>
-          </a:ln>
-        </p:spPr>
-        <p:style>
-          <a:lnRef idx="1">
-            <a:schemeClr val="accent1"/>
-          </a:lnRef>
-          <a:fillRef idx="0">
-            <a:schemeClr val="accent1"/>
-          </a:fillRef>
-          <a:effectRef idx="0">
-            <a:schemeClr val="accent1"/>
-          </a:effectRef>
-          <a:fontRef idx="minor">
-            <a:schemeClr val="tx1"/>
-          </a:fontRef>
-        </p:style>
-      </p:cxnSp>
-      <p:sp>
-        <p:nvSpPr>
-          <p:cNvPr id="39" name="椭圆 38"/>
-          <p:cNvSpPr/>
-          <p:nvPr/>
-        </p:nvSpPr>
-        <p:spPr>
-          <a:xfrm>
-            <a:off x="1949986" y="207818"/>
-            <a:ext cx="2428052" cy="589678"/>
-          </a:xfrm>
-          <a:prstGeom prst="ellipse">
-            <a:avLst/>
-          </a:prstGeom>
-        </p:spPr>
-        <p:style>
-          <a:lnRef idx="2">
-            <a:schemeClr val="accent1">
-              <a:shade val="50000"/>
-            </a:schemeClr>
-          </a:lnRef>
-          <a:fillRef idx="1">
-            <a:schemeClr val="accent1"/>
-          </a:fillRef>
-          <a:effectRef idx="0">
-            <a:schemeClr val="accent1"/>
-          </a:effectRef>
-          <a:fontRef idx="minor">
-            <a:schemeClr val="lt1"/>
-          </a:fontRef>
-        </p:style>
-        <p:txBody>
-          <a:bodyPr rtlCol="0" anchor="ctr"/>
-          <a:lstStyle/>
-          <a:p>
-            <a:pPr algn="ctr"/>
-            <a:r>
-              <a:rPr lang="en-US" altLang="zh-CN" dirty="0" smtClean="0">
-                <a:solidFill>
-                  <a:prstClr val="white"/>
-                </a:solidFill>
-              </a:rPr>
-              <a:t>Inventory</a:t>
-            </a:r>
-            <a:r>
-              <a:rPr lang="zh-CN" altLang="en-US" dirty="0" smtClean="0">
-                <a:solidFill>
-                  <a:prstClr val="white"/>
-                </a:solidFill>
-              </a:rPr>
-              <a:t>文件</a:t>
-            </a:r>
-            <a:endParaRPr lang="en-US" altLang="zh-CN" dirty="0" smtClean="0">
-              <a:solidFill>
-                <a:prstClr val="white"/>
-              </a:solidFill>
-            </a:endParaRPr>
-          </a:p>
-        </p:txBody>
-      </p:sp>
-      <p:cxnSp>
-        <p:nvCxnSpPr>
-          <p:cNvPr id="42" name="直接箭头连接符 41"/>
-          <p:cNvCxnSpPr>
-            <a:stCxn id="39" idx="6"/>
-          </p:cNvCxnSpPr>
-          <p:nvPr/>
-        </p:nvCxnSpPr>
-        <p:spPr>
-          <a:xfrm>
-            <a:off x="4378038" y="502657"/>
-            <a:ext cx="914398" cy="411592"/>
-          </a:xfrm>
-          <a:prstGeom prst="straightConnector1">
-            <a:avLst/>
-          </a:prstGeom>
-          <a:ln>
-            <a:tailEnd type="triangle"/>
-          </a:ln>
-        </p:spPr>
-        <p:style>
-          <a:lnRef idx="1">
-            <a:schemeClr val="accent1"/>
-          </a:lnRef>
-          <a:fillRef idx="0">
-            <a:schemeClr val="accent1"/>
-          </a:fillRef>
-          <a:effectRef idx="0">
-            <a:schemeClr val="accent1"/>
-          </a:effectRef>
-          <a:fontRef idx="minor">
-            <a:schemeClr val="tx1"/>
-          </a:fontRef>
-        </p:style>
-      </p:cxnSp>
-      <p:sp>
-        <p:nvSpPr>
-          <p:cNvPr id="46" name="椭圆 45"/>
-          <p:cNvSpPr/>
-          <p:nvPr/>
-        </p:nvSpPr>
-        <p:spPr>
-          <a:xfrm>
-            <a:off x="9850582" y="844259"/>
-            <a:ext cx="2430000" cy="590400"/>
-          </a:xfrm>
-          <a:prstGeom prst="ellipse">
-            <a:avLst/>
-          </a:prstGeom>
-        </p:spPr>
-        <p:style>
-          <a:lnRef idx="2">
-            <a:schemeClr val="accent1">
-              <a:shade val="50000"/>
-            </a:schemeClr>
-          </a:lnRef>
-          <a:fillRef idx="1">
-            <a:schemeClr val="accent1"/>
-          </a:fillRef>
-          <a:effectRef idx="0">
-            <a:schemeClr val="accent1"/>
-          </a:effectRef>
-          <a:fontRef idx="minor">
-            <a:schemeClr val="lt1"/>
-          </a:fontRef>
-        </p:style>
-        <p:txBody>
-          <a:bodyPr rtlCol="0" anchor="ctr"/>
-          <a:lstStyle/>
-          <a:p>
-            <a:pPr algn="ctr"/>
-            <a:r>
-              <a:rPr lang="en-US" dirty="0" err="1" smtClean="0">
-                <a:solidFill>
-                  <a:prstClr val="white"/>
-                </a:solidFill>
-              </a:rPr>
-              <a:t>Dataloader</a:t>
-            </a:r>
-            <a:endParaRPr lang="en-US" dirty="0" smtClean="0">
-              <a:solidFill>
-                <a:prstClr val="white"/>
-              </a:solidFill>
-            </a:endParaRPr>
-          </a:p>
-        </p:txBody>
-      </p:sp>
-      <p:sp>
-        <p:nvSpPr>
-          <p:cNvPr id="52" name="椭圆 51"/>
-          <p:cNvSpPr/>
-          <p:nvPr/>
-        </p:nvSpPr>
-        <p:spPr>
-          <a:xfrm>
-            <a:off x="9850582" y="207817"/>
-            <a:ext cx="2430000" cy="590400"/>
-          </a:xfrm>
-          <a:prstGeom prst="ellipse">
-            <a:avLst/>
-          </a:prstGeom>
-        </p:spPr>
-        <p:style>
-          <a:lnRef idx="2">
-            <a:schemeClr val="accent1">
-              <a:shade val="50000"/>
-            </a:schemeClr>
-          </a:lnRef>
-          <a:fillRef idx="1">
-            <a:schemeClr val="accent1"/>
-          </a:fillRef>
-          <a:effectRef idx="0">
-            <a:schemeClr val="accent1"/>
-          </a:effectRef>
-          <a:fontRef idx="minor">
-            <a:schemeClr val="lt1"/>
-          </a:fontRef>
-        </p:style>
-        <p:txBody>
-          <a:bodyPr rtlCol="0" anchor="ctr"/>
-          <a:lstStyle/>
-          <a:p>
-            <a:pPr algn="ctr"/>
-            <a:r>
-              <a:rPr lang="en-US" altLang="zh-CN" dirty="0" err="1" smtClean="0">
-                <a:solidFill>
-                  <a:prstClr val="white"/>
-                </a:solidFill>
-              </a:rPr>
-              <a:t>Moudle</a:t>
-            </a:r>
-            <a:endParaRPr lang="en-US" dirty="0" smtClean="0">
-              <a:solidFill>
-                <a:prstClr val="white"/>
-              </a:solidFill>
-            </a:endParaRPr>
-          </a:p>
-        </p:txBody>
-      </p:sp>
-      <p:cxnSp>
-        <p:nvCxnSpPr>
-          <p:cNvPr id="54" name="直接箭头连接符 53"/>
-          <p:cNvCxnSpPr>
-            <a:stCxn id="52" idx="2"/>
-            <a:endCxn id="5" idx="0"/>
-          </p:cNvCxnSpPr>
-          <p:nvPr/>
-        </p:nvCxnSpPr>
-        <p:spPr>
-          <a:xfrm flipH="1">
-            <a:off x="8496166" y="503017"/>
-            <a:ext cx="1354416" cy="385403"/>
-          </a:xfrm>
-          <a:prstGeom prst="straightConnector1">
-            <a:avLst/>
-          </a:prstGeom>
-          <a:ln>
-            <a:tailEnd type="triangle"/>
-          </a:ln>
-        </p:spPr>
-        <p:style>
-          <a:lnRef idx="1">
-            <a:schemeClr val="accent1"/>
-          </a:lnRef>
-          <a:fillRef idx="0">
-            <a:schemeClr val="accent1"/>
-          </a:fillRef>
-          <a:effectRef idx="0">
-            <a:schemeClr val="accent1"/>
-          </a:effectRef>
-          <a:fontRef idx="minor">
-            <a:schemeClr val="tx1"/>
-          </a:fontRef>
-        </p:style>
-      </p:cxnSp>
-      <p:cxnSp>
-        <p:nvCxnSpPr>
-          <p:cNvPr id="56" name="直接箭头连接符 55"/>
-          <p:cNvCxnSpPr>
-            <a:stCxn id="46" idx="2"/>
-            <a:endCxn id="5" idx="3"/>
-          </p:cNvCxnSpPr>
-          <p:nvPr/>
-        </p:nvCxnSpPr>
-        <p:spPr>
-          <a:xfrm flipH="1">
-            <a:off x="9262966" y="1139459"/>
-            <a:ext cx="587616" cy="98161"/>
-          </a:xfrm>
-          <a:prstGeom prst="straightConnector1">
-            <a:avLst/>
-          </a:prstGeom>
-          <a:ln>
-            <a:tailEnd type="triangle"/>
-          </a:ln>
-        </p:spPr>
-        <p:style>
-          <a:lnRef idx="1">
-            <a:schemeClr val="accent1"/>
-          </a:lnRef>
-          <a:fillRef idx="0">
-            <a:schemeClr val="accent1"/>
-          </a:fillRef>
-          <a:effectRef idx="0">
-            <a:schemeClr val="accent1"/>
-          </a:effectRef>
-          <a:fontRef idx="minor">
-            <a:schemeClr val="tx1"/>
-          </a:fontRef>
-        </p:style>
-      </p:cxnSp>
-      <p:cxnSp>
-        <p:nvCxnSpPr>
-          <p:cNvPr id="58" name="直接箭头连接符 57"/>
-          <p:cNvCxnSpPr/>
-          <p:nvPr/>
-        </p:nvCxnSpPr>
-        <p:spPr>
-          <a:xfrm flipH="1" flipV="1">
-            <a:off x="9300664" y="1488244"/>
-            <a:ext cx="658087" cy="567100"/>
-          </a:xfrm>
-          <a:prstGeom prst="straightConnector1">
-            <a:avLst/>
-          </a:prstGeom>
-          <a:ln>
-            <a:tailEnd type="triangle"/>
-          </a:ln>
-        </p:spPr>
-        <p:style>
-          <a:lnRef idx="1">
-            <a:schemeClr val="accent1"/>
-          </a:lnRef>
-          <a:fillRef idx="0">
-            <a:schemeClr val="accent1"/>
-          </a:fillRef>
-          <a:effectRef idx="0">
-            <a:schemeClr val="accent1"/>
-          </a:effectRef>
-          <a:fontRef idx="minor">
-            <a:schemeClr val="tx1"/>
-          </a:fontRef>
-        </p:style>
-      </p:cxnSp>
-      <p:sp>
-        <p:nvSpPr>
-          <p:cNvPr id="59" name="椭圆 58"/>
-          <p:cNvSpPr/>
-          <p:nvPr/>
-        </p:nvSpPr>
-        <p:spPr>
-          <a:xfrm>
-            <a:off x="1939638" y="4024767"/>
-            <a:ext cx="2430000" cy="590400"/>
-          </a:xfrm>
-          <a:prstGeom prst="ellipse">
-            <a:avLst/>
-          </a:prstGeom>
-        </p:spPr>
-        <p:style>
-          <a:lnRef idx="2">
-            <a:schemeClr val="accent1">
-              <a:shade val="50000"/>
-            </a:schemeClr>
-          </a:lnRef>
-          <a:fillRef idx="1">
-            <a:schemeClr val="accent1"/>
-          </a:fillRef>
-          <a:effectRef idx="0">
-            <a:schemeClr val="accent1"/>
-          </a:effectRef>
-          <a:fontRef idx="minor">
-            <a:schemeClr val="lt1"/>
-          </a:fontRef>
-        </p:style>
-        <p:txBody>
-          <a:bodyPr rtlCol="0" anchor="ctr"/>
-          <a:lstStyle/>
-          <a:p>
-            <a:pPr algn="ctr"/>
-            <a:r>
-              <a:rPr lang="en-US" altLang="zh-CN" dirty="0" smtClean="0">
-                <a:solidFill>
-                  <a:prstClr val="white"/>
-                </a:solidFill>
-              </a:rPr>
-              <a:t>Callback</a:t>
-            </a:r>
-          </a:p>
-        </p:txBody>
-      </p:sp>
-      <p:cxnSp>
-        <p:nvCxnSpPr>
-          <p:cNvPr id="61" name="直接箭头连接符 60"/>
-          <p:cNvCxnSpPr>
-            <a:stCxn id="9" idx="6"/>
-          </p:cNvCxnSpPr>
-          <p:nvPr/>
-        </p:nvCxnSpPr>
-        <p:spPr>
-          <a:xfrm flipV="1">
-            <a:off x="4379985" y="3363566"/>
-            <a:ext cx="912451" cy="12702"/>
-          </a:xfrm>
-          <a:prstGeom prst="straightConnector1">
-            <a:avLst/>
-          </a:prstGeom>
-          <a:ln>
-            <a:tailEnd type="triangle"/>
-          </a:ln>
-        </p:spPr>
-        <p:style>
-          <a:lnRef idx="1">
-            <a:schemeClr val="accent1"/>
-          </a:lnRef>
-          <a:fillRef idx="0">
-            <a:schemeClr val="accent1"/>
-          </a:fillRef>
-          <a:effectRef idx="0">
-            <a:schemeClr val="accent1"/>
-          </a:effectRef>
-          <a:fontRef idx="minor">
-            <a:schemeClr val="tx1"/>
-          </a:fontRef>
-        </p:style>
-      </p:cxnSp>
-      <p:cxnSp>
-        <p:nvCxnSpPr>
-          <p:cNvPr id="63" name="直接箭头连接符 62"/>
-          <p:cNvCxnSpPr>
-            <a:stCxn id="59" idx="6"/>
-          </p:cNvCxnSpPr>
-          <p:nvPr/>
-        </p:nvCxnSpPr>
-        <p:spPr>
-          <a:xfrm flipV="1">
-            <a:off x="4369638" y="3447161"/>
-            <a:ext cx="992072" cy="872806"/>
-          </a:xfrm>
-          <a:prstGeom prst="straightConnector1">
-            <a:avLst/>
-          </a:prstGeom>
-          <a:ln>
-            <a:tailEnd type="triangle"/>
-          </a:ln>
-        </p:spPr>
-        <p:style>
-          <a:lnRef idx="1">
-            <a:schemeClr val="accent1"/>
-          </a:lnRef>
-          <a:fillRef idx="0">
-            <a:schemeClr val="accent1"/>
-          </a:fillRef>
-          <a:effectRef idx="0">
-            <a:schemeClr val="accent1"/>
-          </a:effectRef>
-          <a:fontRef idx="minor">
-            <a:schemeClr val="tx1"/>
-          </a:fontRef>
-        </p:style>
-      </p:cxnSp>
-      <p:sp>
-        <p:nvSpPr>
-          <p:cNvPr id="68" name="椭圆 67"/>
-          <p:cNvSpPr/>
-          <p:nvPr/>
-        </p:nvSpPr>
-        <p:spPr>
-          <a:xfrm>
-            <a:off x="1939638" y="4968466"/>
-            <a:ext cx="2430000" cy="590400"/>
-          </a:xfrm>
-          <a:prstGeom prst="ellipse">
-            <a:avLst/>
-          </a:prstGeom>
-        </p:spPr>
-        <p:style>
-          <a:lnRef idx="2">
-            <a:schemeClr val="accent1">
-              <a:shade val="50000"/>
-            </a:schemeClr>
-          </a:lnRef>
-          <a:fillRef idx="1">
-            <a:schemeClr val="accent1"/>
-          </a:fillRef>
-          <a:effectRef idx="0">
-            <a:schemeClr val="accent1"/>
-          </a:effectRef>
-          <a:fontRef idx="minor">
-            <a:schemeClr val="lt1"/>
-          </a:fontRef>
-        </p:style>
-        <p:txBody>
-          <a:bodyPr rtlCol="0" anchor="ctr"/>
-          <a:lstStyle/>
-          <a:p>
-            <a:pPr algn="ctr"/>
-            <a:r>
-              <a:rPr lang="en-US" altLang="zh-CN" dirty="0" smtClean="0">
-                <a:solidFill>
-                  <a:prstClr val="white"/>
-                </a:solidFill>
-              </a:rPr>
-              <a:t>Password</a:t>
-            </a:r>
-            <a:endParaRPr lang="en-US" dirty="0" smtClean="0">
-              <a:solidFill>
-                <a:prstClr val="white"/>
-              </a:solidFill>
-            </a:endParaRPr>
-          </a:p>
-        </p:txBody>
-      </p:sp>
-      <p:cxnSp>
-        <p:nvCxnSpPr>
-          <p:cNvPr id="70" name="直接箭头连接符 69"/>
-          <p:cNvCxnSpPr/>
-          <p:nvPr/>
-        </p:nvCxnSpPr>
-        <p:spPr>
-          <a:xfrm flipV="1">
-            <a:off x="4322618" y="3463635"/>
-            <a:ext cx="1620982" cy="1801092"/>
-          </a:xfrm>
-          <a:prstGeom prst="straightConnector1">
-            <a:avLst/>
-          </a:prstGeom>
-          <a:ln>
-            <a:tailEnd type="triangle"/>
-          </a:ln>
-        </p:spPr>
-        <p:style>
-          <a:lnRef idx="1">
-            <a:schemeClr val="accent1"/>
-          </a:lnRef>
-          <a:fillRef idx="0">
-            <a:schemeClr val="accent1"/>
-          </a:fillRef>
-          <a:effectRef idx="0">
-            <a:schemeClr val="accent1"/>
-          </a:effectRef>
-          <a:fontRef idx="minor">
-            <a:schemeClr val="tx1"/>
-          </a:fontRef>
-        </p:style>
-      </p:cxnSp>
-      <p:sp>
-        <p:nvSpPr>
-          <p:cNvPr id="71" name="圆角矩形 70"/>
-          <p:cNvSpPr/>
-          <p:nvPr/>
-        </p:nvSpPr>
-        <p:spPr>
-          <a:xfrm>
-            <a:off x="8811493" y="4175952"/>
-            <a:ext cx="1794163" cy="612526"/>
-          </a:xfrm>
-          <a:prstGeom prst="roundRect">
-            <a:avLst/>
-          </a:prstGeom>
-        </p:spPr>
-        <p:style>
-          <a:lnRef idx="2">
-            <a:schemeClr val="accent1">
-              <a:shade val="50000"/>
-            </a:schemeClr>
-          </a:lnRef>
-          <a:fillRef idx="1">
-            <a:schemeClr val="accent1"/>
-          </a:fillRef>
-          <a:effectRef idx="0">
-            <a:schemeClr val="accent1"/>
-          </a:effectRef>
-          <a:fontRef idx="minor">
-            <a:schemeClr val="lt1"/>
-          </a:fontRef>
-        </p:style>
-        <p:txBody>
-          <a:bodyPr rtlCol="0" anchor="ctr"/>
-          <a:lstStyle/>
-          <a:p>
-            <a:pPr algn="ctr"/>
-            <a:r>
-              <a:rPr lang="en-US" altLang="zh-CN" dirty="0" smtClean="0">
-                <a:solidFill>
-                  <a:prstClr val="white"/>
-                </a:solidFill>
-              </a:rPr>
-              <a:t>Remote Host1</a:t>
-            </a:r>
-          </a:p>
-        </p:txBody>
-      </p:sp>
-      <p:sp>
-        <p:nvSpPr>
-          <p:cNvPr id="72" name="椭圆 71"/>
-          <p:cNvSpPr/>
-          <p:nvPr/>
-        </p:nvSpPr>
-        <p:spPr>
-          <a:xfrm>
-            <a:off x="1949984" y="1029898"/>
-            <a:ext cx="2430000" cy="590400"/>
-          </a:xfrm>
-          <a:prstGeom prst="ellipse">
-            <a:avLst/>
-          </a:prstGeom>
-        </p:spPr>
-        <p:style>
-          <a:lnRef idx="2">
-            <a:schemeClr val="accent1">
-              <a:shade val="50000"/>
-            </a:schemeClr>
-          </a:lnRef>
-          <a:fillRef idx="1">
-            <a:schemeClr val="accent1"/>
-          </a:fillRef>
-          <a:effectRef idx="0">
-            <a:schemeClr val="accent1"/>
-          </a:effectRef>
-          <a:fontRef idx="minor">
-            <a:schemeClr val="lt1"/>
-          </a:fontRef>
-        </p:style>
-        <p:txBody>
-          <a:bodyPr rtlCol="0" anchor="ctr"/>
-          <a:lstStyle/>
-          <a:p>
-            <a:pPr algn="ctr"/>
-            <a:r>
-              <a:rPr lang="en-US" dirty="0" err="1" smtClean="0">
-                <a:solidFill>
-                  <a:prstClr val="white"/>
-                </a:solidFill>
-              </a:rPr>
-              <a:t>Varmanager</a:t>
-            </a:r>
-            <a:endParaRPr lang="en-US" dirty="0" smtClean="0">
-              <a:solidFill>
-                <a:prstClr val="white"/>
-              </a:solidFill>
-            </a:endParaRPr>
-          </a:p>
-        </p:txBody>
-      </p:sp>
-      <p:cxnSp>
-        <p:nvCxnSpPr>
-          <p:cNvPr id="77" name="直接箭头连接符 76"/>
-          <p:cNvCxnSpPr>
-            <a:stCxn id="8" idx="5"/>
-          </p:cNvCxnSpPr>
-          <p:nvPr/>
-        </p:nvCxnSpPr>
-        <p:spPr>
-          <a:xfrm>
-            <a:off x="4022458" y="2314455"/>
-            <a:ext cx="1269978" cy="628768"/>
-          </a:xfrm>
-          <a:prstGeom prst="straightConnector1">
-            <a:avLst/>
-          </a:prstGeom>
-          <a:ln>
-            <a:tailEnd type="triangle"/>
-          </a:ln>
-        </p:spPr>
-        <p:style>
-          <a:lnRef idx="1">
-            <a:schemeClr val="accent1"/>
-          </a:lnRef>
-          <a:fillRef idx="0">
-            <a:schemeClr val="accent1"/>
-          </a:fillRef>
-          <a:effectRef idx="0">
-            <a:schemeClr val="accent1"/>
-          </a:effectRef>
-          <a:fontRef idx="minor">
-            <a:schemeClr val="tx1"/>
-          </a:fontRef>
-        </p:style>
-      </p:cxnSp>
-      <p:cxnSp>
-        <p:nvCxnSpPr>
-          <p:cNvPr id="79" name="直接箭头连接符 78"/>
-          <p:cNvCxnSpPr/>
-          <p:nvPr/>
-        </p:nvCxnSpPr>
-        <p:spPr>
-          <a:xfrm flipH="1">
-            <a:off x="9045735" y="2207505"/>
-            <a:ext cx="1083221" cy="662680"/>
-          </a:xfrm>
-          <a:prstGeom prst="straightConnector1">
-            <a:avLst/>
-          </a:prstGeom>
-          <a:ln>
-            <a:tailEnd type="triangle"/>
-          </a:ln>
-        </p:spPr>
-        <p:style>
-          <a:lnRef idx="1">
-            <a:schemeClr val="accent1"/>
-          </a:lnRef>
-          <a:fillRef idx="0">
-            <a:schemeClr val="accent1"/>
-          </a:fillRef>
-          <a:effectRef idx="0">
-            <a:schemeClr val="accent1"/>
-          </a:effectRef>
-          <a:fontRef idx="minor">
-            <a:schemeClr val="tx1"/>
-          </a:fontRef>
-        </p:style>
-      </p:cxnSp>
-      <p:cxnSp>
-        <p:nvCxnSpPr>
-          <p:cNvPr id="81" name="直接箭头连接符 80"/>
-          <p:cNvCxnSpPr/>
-          <p:nvPr/>
-        </p:nvCxnSpPr>
-        <p:spPr>
-          <a:xfrm>
-            <a:off x="7910945" y="3463635"/>
-            <a:ext cx="900548" cy="712317"/>
-          </a:xfrm>
-          <a:prstGeom prst="straightConnector1">
-            <a:avLst/>
-          </a:prstGeom>
-          <a:ln>
-            <a:tailEnd type="triangle"/>
-          </a:ln>
-        </p:spPr>
-        <p:style>
-          <a:lnRef idx="1">
-            <a:schemeClr val="accent1"/>
-          </a:lnRef>
-          <a:fillRef idx="0">
-            <a:schemeClr val="accent1"/>
-          </a:fillRef>
-          <a:effectRef idx="0">
-            <a:schemeClr val="accent1"/>
-          </a:effectRef>
-          <a:fontRef idx="minor">
-            <a:schemeClr val="tx1"/>
-          </a:fontRef>
-        </p:style>
-      </p:cxnSp>
-      <p:sp>
-        <p:nvSpPr>
-          <p:cNvPr id="82" name="圆角矩形 81"/>
-          <p:cNvSpPr/>
-          <p:nvPr/>
-        </p:nvSpPr>
-        <p:spPr>
-          <a:xfrm>
-            <a:off x="8811493" y="4932759"/>
-            <a:ext cx="1863595" cy="581890"/>
-          </a:xfrm>
-          <a:prstGeom prst="roundRect">
-            <a:avLst/>
-          </a:prstGeom>
-        </p:spPr>
-        <p:style>
-          <a:lnRef idx="2">
-            <a:schemeClr val="accent1">
-              <a:shade val="50000"/>
-            </a:schemeClr>
-          </a:lnRef>
-          <a:fillRef idx="1">
-            <a:schemeClr val="accent1"/>
-          </a:fillRef>
-          <a:effectRef idx="0">
-            <a:schemeClr val="accent1"/>
-          </a:effectRef>
-          <a:fontRef idx="minor">
-            <a:schemeClr val="lt1"/>
-          </a:fontRef>
-        </p:style>
-        <p:txBody>
-          <a:bodyPr rtlCol="0" anchor="ctr"/>
-          <a:lstStyle/>
-          <a:p>
-            <a:pPr algn="ctr"/>
-            <a:r>
-              <a:rPr lang="en-US" altLang="zh-CN" dirty="0" smtClean="0">
-                <a:solidFill>
-                  <a:prstClr val="white"/>
-                </a:solidFill>
-              </a:rPr>
-              <a:t>Remote Host2</a:t>
-            </a:r>
-            <a:endParaRPr lang="en-US" dirty="0" smtClean="0">
-              <a:solidFill>
-                <a:prstClr val="white"/>
-              </a:solidFill>
-            </a:endParaRPr>
-          </a:p>
-        </p:txBody>
-      </p:sp>
-      <p:cxnSp>
-        <p:nvCxnSpPr>
-          <p:cNvPr id="84" name="直接箭头连接符 83"/>
-          <p:cNvCxnSpPr/>
-          <p:nvPr/>
-        </p:nvCxnSpPr>
-        <p:spPr>
-          <a:xfrm>
-            <a:off x="7910945" y="3463635"/>
-            <a:ext cx="900548" cy="1760069"/>
-          </a:xfrm>
-          <a:prstGeom prst="straightConnector1">
-            <a:avLst/>
-          </a:prstGeom>
-          <a:ln>
-            <a:tailEnd type="triangle"/>
-          </a:ln>
-        </p:spPr>
-        <p:style>
-          <a:lnRef idx="1">
-            <a:schemeClr val="accent1"/>
-          </a:lnRef>
-          <a:fillRef idx="0">
-            <a:schemeClr val="accent1"/>
-          </a:fillRef>
-          <a:effectRef idx="0">
-            <a:schemeClr val="accent1"/>
-          </a:effectRef>
-          <a:fontRef idx="minor">
-            <a:schemeClr val="tx1"/>
-          </a:fontRef>
-        </p:style>
-      </p:cxnSp>
+      </p:pic>
       <p:pic>
         <p:nvPicPr>
           <p:cNvPr id="31" name="Picture 3" descr="http://www.yuntoutiao.com/wp-content/uploads/2015/10/1016.sdt-redhat.jpg-300x122.jpg"/>
@@ -9192,7 +8578,7 @@
           <p:nvPr/>
         </p:nvPicPr>
         <p:blipFill>
-          <a:blip r:embed="rId2">
+          <a:blip r:embed="rId3">
             <a:extLst>
               <a:ext uri="{28A0092B-C50C-407E-A947-70E740481C1C}">
                 <a14:useLocalDpi xmlns:a14="http://schemas.microsoft.com/office/drawing/2010/main" val="0"/>
@@ -9224,6 +8610,49 @@
           </a:extLst>
         </p:spPr>
       </p:pic>
+      <p:sp>
+        <p:nvSpPr>
+          <p:cNvPr id="2" name="标题 1"/>
+          <p:cNvSpPr>
+            <a:spLocks noGrp="1"/>
+          </p:cNvSpPr>
+          <p:nvPr>
+            <p:ph type="title"/>
+          </p:nvPr>
+        </p:nvSpPr>
+        <p:spPr/>
+        <p:txBody>
+          <a:bodyPr/>
+          <a:lstStyle/>
+          <a:p>
+            <a:pPr algn="ctr"/>
+            <a:r>
+              <a:rPr lang="en-US" altLang="zh-CN" dirty="0" err="1" smtClean="0"/>
+              <a:t>Ansible</a:t>
+            </a:r>
+            <a:r>
+              <a:rPr lang="en-US" altLang="zh-CN" dirty="0" smtClean="0"/>
+              <a:t> </a:t>
+            </a:r>
+            <a:r>
+              <a:rPr lang="en-US" altLang="zh-CN" dirty="0"/>
+              <a:t>Python API </a:t>
+            </a:r>
+            <a:r>
+              <a:rPr lang="zh-CN" altLang="en-US" dirty="0"/>
+              <a:t>的调用流程</a:t>
+            </a:r>
+            <a:r>
+              <a:rPr lang="en-US" altLang="zh-CN" dirty="0"/>
+              <a:t/>
+            </a:r>
+            <a:br>
+              <a:rPr lang="en-US" altLang="zh-CN" dirty="0"/>
+            </a:br>
+            <a:endParaRPr lang="en-US" dirty="0"/>
+          </a:p>
+        </p:txBody>
+      </p:sp>
     </p:spTree>
     <p:extLst>
       <p:ext uri="{BB962C8B-B14F-4D97-AF65-F5344CB8AC3E}">
@@ -9244,7 +8673,7 @@
 </p:sld>
 </file>
 
-<file path=ppt/slides/slide9.xml><?xml version="1.0" encoding="utf-8"?>
+<file path=ppt/slides/slide8.xml><?xml version="1.0" encoding="utf-8"?>
 <p:sld xmlns:a="http://schemas.openxmlformats.org/drawingml/2006/main" xmlns:r="http://schemas.openxmlformats.org/officeDocument/2006/relationships" xmlns:p="http://schemas.openxmlformats.org/presentationml/2006/main">
   <p:cSld>
     <p:bg>
@@ -9337,6 +8766,10 @@
             <a:r>
               <a:rPr lang="en-US" altLang="zh-CN" dirty="0" err="1" smtClean="0"/>
               <a:t>Ansible</a:t>
+            </a:r>
+            <a:r>
+              <a:rPr lang="en-US" altLang="zh-CN" dirty="0" smtClean="0"/>
+              <a:t> Python API</a:t>
             </a:r>
             <a:r>
               <a:rPr lang="zh-CN" altLang="en-US" dirty="0" smtClean="0"/>
@@ -10043,4 +9476,265 @@
     </a:ext>
   </a:extLst>
 </a:theme>
+</file>
+
+<file path=ppt/theme/theme3.xml><?xml version="1.0" encoding="utf-8"?>
+<a:theme xmlns:a="http://schemas.openxmlformats.org/drawingml/2006/main" name="Office 主题">
+  <a:themeElements>
+    <a:clrScheme name="Office">
+      <a:dk1>
+        <a:sysClr val="windowText" lastClr="000000"/>
+      </a:dk1>
+      <a:lt1>
+        <a:sysClr val="window" lastClr="FFFFFF"/>
+      </a:lt1>
+      <a:dk2>
+        <a:srgbClr val="44546A"/>
+      </a:dk2>
+      <a:lt2>
+        <a:srgbClr val="E7E6E6"/>
+      </a:lt2>
+      <a:accent1>
+        <a:srgbClr val="5B9BD5"/>
+      </a:accent1>
+      <a:accent2>
+        <a:srgbClr val="ED7D31"/>
+      </a:accent2>
+      <a:accent3>
+        <a:srgbClr val="A5A5A5"/>
+      </a:accent3>
+      <a:accent4>
+        <a:srgbClr val="FFC000"/>
+      </a:accent4>
+      <a:accent5>
+        <a:srgbClr val="4472C4"/>
+      </a:accent5>
+      <a:accent6>
+        <a:srgbClr val="70AD47"/>
+      </a:accent6>
+      <a:hlink>
+        <a:srgbClr val="0563C1"/>
+      </a:hlink>
+      <a:folHlink>
+        <a:srgbClr val="954F72"/>
+      </a:folHlink>
+    </a:clrScheme>
+    <a:fontScheme name="Office">
+      <a:majorFont>
+        <a:latin typeface="Calibri Light" panose="020F0302020204030204"/>
+        <a:ea typeface=""/>
+        <a:cs typeface=""/>
+        <a:font script="Jpan" typeface="ＭＳ Ｐゴシック"/>
+        <a:font script="Hang" typeface="맑은 고딕"/>
+        <a:font script="Hans" typeface="宋体"/>
+        <a:font script="Hant" typeface="新細明體"/>
+        <a:font script="Arab" typeface="Times New Roman"/>
+        <a:font script="Hebr" typeface="Times New Roman"/>
+        <a:font script="Thai" typeface="Angsana New"/>
+        <a:font script="Ethi" typeface="Nyala"/>
+        <a:font script="Beng" typeface="Vrinda"/>
+        <a:font script="Gujr" typeface="Shruti"/>
+        <a:font script="Khmr" typeface="MoolBoran"/>
+        <a:font script="Knda" typeface="Tunga"/>
+        <a:font script="Guru" typeface="Raavi"/>
+        <a:font script="Cans" typeface="Euphemia"/>
+        <a:font script="Cher" typeface="Plantagenet Cherokee"/>
+        <a:font script="Yiii" typeface="Microsoft Yi Baiti"/>
+        <a:font script="Tibt" typeface="Microsoft Himalaya"/>
+        <a:font script="Thaa" typeface="MV Boli"/>
+        <a:font script="Deva" typeface="Mangal"/>
+        <a:font script="Telu" typeface="Gautami"/>
+        <a:font script="Taml" typeface="Latha"/>
+        <a:font script="Syrc" typeface="Estrangelo Edessa"/>
+        <a:font script="Orya" typeface="Kalinga"/>
+        <a:font script="Mlym" typeface="Kartika"/>
+        <a:font script="Laoo" typeface="DokChampa"/>
+        <a:font script="Sinh" typeface="Iskoola Pota"/>
+        <a:font script="Mong" typeface="Mongolian Baiti"/>
+        <a:font script="Viet" typeface="Times New Roman"/>
+        <a:font script="Uigh" typeface="Microsoft Uighur"/>
+        <a:font script="Geor" typeface="Sylfaen"/>
+      </a:majorFont>
+      <a:minorFont>
+        <a:latin typeface="Calibri" panose="020F0502020204030204"/>
+        <a:ea typeface=""/>
+        <a:cs typeface=""/>
+        <a:font script="Jpan" typeface="ＭＳ Ｐゴシック"/>
+        <a:font script="Hang" typeface="맑은 고딕"/>
+        <a:font script="Hans" typeface="宋体"/>
+        <a:font script="Hant" typeface="新細明體"/>
+        <a:font script="Arab" typeface="Arial"/>
+        <a:font script="Hebr" typeface="Arial"/>
+        <a:font script="Thai" typeface="Cordia New"/>
+        <a:font script="Ethi" typeface="Nyala"/>
+        <a:font script="Beng" typeface="Vrinda"/>
+        <a:font script="Gujr" typeface="Shruti"/>
+        <a:font script="Khmr" typeface="DaunPenh"/>
+        <a:font script="Knda" typeface="Tunga"/>
+        <a:font script="Guru" typeface="Raavi"/>
+        <a:font script="Cans" typeface="Euphemia"/>
+        <a:font script="Cher" typeface="Plantagenet Cherokee"/>
+        <a:font script="Yiii" typeface="Microsoft Yi Baiti"/>
+        <a:font script="Tibt" typeface="Microsoft Himalaya"/>
+        <a:font script="Thaa" typeface="MV Boli"/>
+        <a:font script="Deva" typeface="Mangal"/>
+        <a:font script="Telu" typeface="Gautami"/>
+        <a:font script="Taml" typeface="Latha"/>
+        <a:font script="Syrc" typeface="Estrangelo Edessa"/>
+        <a:font script="Orya" typeface="Kalinga"/>
+        <a:font script="Mlym" typeface="Kartika"/>
+        <a:font script="Laoo" typeface="DokChampa"/>
+        <a:font script="Sinh" typeface="Iskoola Pota"/>
+        <a:font script="Mong" typeface="Mongolian Baiti"/>
+        <a:font script="Viet" typeface="Arial"/>
+        <a:font script="Uigh" typeface="Microsoft Uighur"/>
+        <a:font script="Geor" typeface="Sylfaen"/>
+      </a:minorFont>
+    </a:fontScheme>
+    <a:fmtScheme name="Office">
+      <a:fillStyleLst>
+        <a:solidFill>
+          <a:schemeClr val="phClr"/>
+        </a:solidFill>
+        <a:gradFill rotWithShape="1">
+          <a:gsLst>
+            <a:gs pos="0">
+              <a:schemeClr val="phClr">
+                <a:lumMod val="110000"/>
+                <a:satMod val="105000"/>
+                <a:tint val="67000"/>
+              </a:schemeClr>
+            </a:gs>
+            <a:gs pos="50000">
+              <a:schemeClr val="phClr">
+                <a:lumMod val="105000"/>
+                <a:satMod val="103000"/>
+                <a:tint val="73000"/>
+              </a:schemeClr>
+            </a:gs>
+            <a:gs pos="100000">
+              <a:schemeClr val="phClr">
+                <a:lumMod val="105000"/>
+                <a:satMod val="109000"/>
+                <a:tint val="81000"/>
+              </a:schemeClr>
+            </a:gs>
+          </a:gsLst>
+          <a:lin ang="5400000" scaled="0"/>
+        </a:gradFill>
+        <a:gradFill rotWithShape="1">
+          <a:gsLst>
+            <a:gs pos="0">
+              <a:schemeClr val="phClr">
+                <a:satMod val="103000"/>
+                <a:lumMod val="102000"/>
+                <a:tint val="94000"/>
+              </a:schemeClr>
+            </a:gs>
+            <a:gs pos="50000">
+              <a:schemeClr val="phClr">
+                <a:satMod val="110000"/>
+                <a:lumMod val="100000"/>
+                <a:shade val="100000"/>
+              </a:schemeClr>
+            </a:gs>
+            <a:gs pos="100000">
+              <a:schemeClr val="phClr">
+                <a:lumMod val="99000"/>
+                <a:satMod val="120000"/>
+                <a:shade val="78000"/>
+              </a:schemeClr>
+            </a:gs>
+          </a:gsLst>
+          <a:lin ang="5400000" scaled="0"/>
+        </a:gradFill>
+      </a:fillStyleLst>
+      <a:lnStyleLst>
+        <a:ln w="6350" cap="flat" cmpd="sng" algn="ctr">
+          <a:solidFill>
+            <a:schemeClr val="phClr"/>
+          </a:solidFill>
+          <a:prstDash val="solid"/>
+          <a:miter lim="800000"/>
+        </a:ln>
+        <a:ln w="12700" cap="flat" cmpd="sng" algn="ctr">
+          <a:solidFill>
+            <a:schemeClr val="phClr"/>
+          </a:solidFill>
+          <a:prstDash val="solid"/>
+          <a:miter lim="800000"/>
+        </a:ln>
+        <a:ln w="19050" cap="flat" cmpd="sng" algn="ctr">
+          <a:solidFill>
+            <a:schemeClr val="phClr"/>
+          </a:solidFill>
+          <a:prstDash val="solid"/>
+          <a:miter lim="800000"/>
+        </a:ln>
+      </a:lnStyleLst>
+      <a:effectStyleLst>
+        <a:effectStyle>
+          <a:effectLst/>
+        </a:effectStyle>
+        <a:effectStyle>
+          <a:effectLst/>
+        </a:effectStyle>
+        <a:effectStyle>
+          <a:effectLst>
+            <a:outerShdw blurRad="57150" dist="19050" dir="5400000" algn="ctr" rotWithShape="0">
+              <a:srgbClr val="000000">
+                <a:alpha val="63000"/>
+              </a:srgbClr>
+            </a:outerShdw>
+          </a:effectLst>
+        </a:effectStyle>
+      </a:effectStyleLst>
+      <a:bgFillStyleLst>
+        <a:solidFill>
+          <a:schemeClr val="phClr"/>
+        </a:solidFill>
+        <a:solidFill>
+          <a:schemeClr val="phClr">
+            <a:tint val="95000"/>
+            <a:satMod val="170000"/>
+          </a:schemeClr>
+        </a:solidFill>
+        <a:gradFill rotWithShape="1">
+          <a:gsLst>
+            <a:gs pos="0">
+              <a:schemeClr val="phClr">
+                <a:tint val="93000"/>
+                <a:satMod val="150000"/>
+                <a:shade val="98000"/>
+                <a:lumMod val="102000"/>
+              </a:schemeClr>
+            </a:gs>
+            <a:gs pos="50000">
+              <a:schemeClr val="phClr">
+                <a:tint val="98000"/>
+                <a:satMod val="130000"/>
+                <a:shade val="90000"/>
+                <a:lumMod val="103000"/>
+              </a:schemeClr>
+            </a:gs>
+            <a:gs pos="100000">
+              <a:schemeClr val="phClr">
+                <a:shade val="63000"/>
+                <a:satMod val="120000"/>
+              </a:schemeClr>
+            </a:gs>
+          </a:gsLst>
+          <a:lin ang="5400000" scaled="0"/>
+        </a:gradFill>
+      </a:bgFillStyleLst>
+    </a:fmtScheme>
+  </a:themeElements>
+  <a:objectDefaults/>
+  <a:extraClrSchemeLst/>
+  <a:extLst>
+    <a:ext uri="{05A4C25C-085E-4340-85A3-A5531E510DB2}">
+      <thm15:themeFamily xmlns:thm15="http://schemas.microsoft.com/office/thememl/2012/main" name="Office Theme" id="{62F939B6-93AF-4DB8-9C6B-D6C7DFDC589F}" vid="{4A3C46E8-61CC-4603-A589-7422A47A8E4A}"/>
+    </a:ext>
+  </a:extLst>
+</a:theme>
 </file>
</xml_diff>